<commit_message>
working on reduced model ode to sympy
</commit_message>
<xml_diff>
--- a/miscellaneous/presentations/20200715_syncell_mtg.pptx
+++ b/miscellaneous/presentations/20200715_syncell_mtg.pptx
@@ -3502,7 +3502,7 @@
           </a:p>
           <a:p>
             <a:r>
-              <a:rPr lang="en-US" dirty="0"/>
+              <a:rPr lang="en-US" b="1" dirty="0"/>
               <a:t>Should you try this in biocrnpyler/bioscrape for the time being?</a:t>
             </a:r>
           </a:p>
@@ -3580,9 +3580,17 @@
               <a:t>Gro?chemostat</a:t>
             </a:r>
             <a:r>
-              <a:rPr lang="en-US"/>
+              <a:rPr lang="en-US" dirty="0"/>
               <a:t>?</a:t>
             </a:r>
+          </a:p>
+          <a:p>
+            <a:pPr lvl="1"/>
+            <a:endParaRPr lang="en-US" dirty="0"/>
+          </a:p>
+          <a:p>
+            <a:pPr lvl="1"/>
+            <a:endParaRPr lang="en-US" dirty="0"/>
           </a:p>
           <a:p>
             <a:endParaRPr lang="en-US" dirty="0"/>

</xml_diff>

<commit_message>
trying reduced model more
</commit_message>
<xml_diff>
--- a/miscellaneous/presentations/20200715_syncell_mtg.pptx
+++ b/miscellaneous/presentations/20200715_syncell_mtg.pptx
@@ -263,7 +263,7 @@
           <a:p>
             <a:fld id="{3B3400CD-7287-EA41-97B8-6C373A830532}" type="datetimeFigureOut">
               <a:rPr lang="en-US" smtClean="0"/>
-              <a:t>7/6/20</a:t>
+              <a:t>7/8/20</a:t>
             </a:fld>
             <a:endParaRPr lang="en-US"/>
           </a:p>
@@ -461,7 +461,7 @@
           <a:p>
             <a:fld id="{3B3400CD-7287-EA41-97B8-6C373A830532}" type="datetimeFigureOut">
               <a:rPr lang="en-US" smtClean="0"/>
-              <a:t>7/6/20</a:t>
+              <a:t>7/8/20</a:t>
             </a:fld>
             <a:endParaRPr lang="en-US"/>
           </a:p>
@@ -669,7 +669,7 @@
           <a:p>
             <a:fld id="{3B3400CD-7287-EA41-97B8-6C373A830532}" type="datetimeFigureOut">
               <a:rPr lang="en-US" smtClean="0"/>
-              <a:t>7/6/20</a:t>
+              <a:t>7/8/20</a:t>
             </a:fld>
             <a:endParaRPr lang="en-US"/>
           </a:p>
@@ -869,7 +869,7 @@
           <a:p>
             <a:fld id="{3B3400CD-7287-EA41-97B8-6C373A830532}" type="datetimeFigureOut">
               <a:rPr lang="en-US" smtClean="0"/>
-              <a:t>7/6/20</a:t>
+              <a:t>7/8/20</a:t>
             </a:fld>
             <a:endParaRPr lang="en-US"/>
           </a:p>
@@ -1144,7 +1144,7 @@
           <a:p>
             <a:fld id="{3B3400CD-7287-EA41-97B8-6C373A830532}" type="datetimeFigureOut">
               <a:rPr lang="en-US" smtClean="0"/>
-              <a:t>7/6/20</a:t>
+              <a:t>7/8/20</a:t>
             </a:fld>
             <a:endParaRPr lang="en-US"/>
           </a:p>
@@ -1409,7 +1409,7 @@
           <a:p>
             <a:fld id="{3B3400CD-7287-EA41-97B8-6C373A830532}" type="datetimeFigureOut">
               <a:rPr lang="en-US" smtClean="0"/>
-              <a:t>7/6/20</a:t>
+              <a:t>7/8/20</a:t>
             </a:fld>
             <a:endParaRPr lang="en-US"/>
           </a:p>
@@ -1821,7 +1821,7 @@
           <a:p>
             <a:fld id="{3B3400CD-7287-EA41-97B8-6C373A830532}" type="datetimeFigureOut">
               <a:rPr lang="en-US" smtClean="0"/>
-              <a:t>7/6/20</a:t>
+              <a:t>7/8/20</a:t>
             </a:fld>
             <a:endParaRPr lang="en-US"/>
           </a:p>
@@ -1962,7 +1962,7 @@
           <a:p>
             <a:fld id="{3B3400CD-7287-EA41-97B8-6C373A830532}" type="datetimeFigureOut">
               <a:rPr lang="en-US" smtClean="0"/>
-              <a:t>7/6/20</a:t>
+              <a:t>7/8/20</a:t>
             </a:fld>
             <a:endParaRPr lang="en-US"/>
           </a:p>
@@ -2075,7 +2075,7 @@
           <a:p>
             <a:fld id="{3B3400CD-7287-EA41-97B8-6C373A830532}" type="datetimeFigureOut">
               <a:rPr lang="en-US" smtClean="0"/>
-              <a:t>7/6/20</a:t>
+              <a:t>7/8/20</a:t>
             </a:fld>
             <a:endParaRPr lang="en-US"/>
           </a:p>
@@ -2386,7 +2386,7 @@
           <a:p>
             <a:fld id="{3B3400CD-7287-EA41-97B8-6C373A830532}" type="datetimeFigureOut">
               <a:rPr lang="en-US" smtClean="0"/>
-              <a:t>7/6/20</a:t>
+              <a:t>7/8/20</a:t>
             </a:fld>
             <a:endParaRPr lang="en-US"/>
           </a:p>
@@ -2677,7 +2677,7 @@
           <a:p>
             <a:fld id="{3B3400CD-7287-EA41-97B8-6C373A830532}" type="datetimeFigureOut">
               <a:rPr lang="en-US" smtClean="0"/>
-              <a:t>7/6/20</a:t>
+              <a:t>7/8/20</a:t>
             </a:fld>
             <a:endParaRPr lang="en-US"/>
           </a:p>
@@ -2920,7 +2920,7 @@
           <a:p>
             <a:fld id="{3B3400CD-7287-EA41-97B8-6C373A830532}" type="datetimeFigureOut">
               <a:rPr lang="en-US" smtClean="0"/>
-              <a:t>7/6/20</a:t>
+              <a:t>7/8/20</a:t>
             </a:fld>
             <a:endParaRPr lang="en-US"/>
           </a:p>
@@ -3475,7 +3475,9 @@
         </p:nvSpPr>
         <p:spPr/>
         <p:txBody>
-          <a:bodyPr/>
+          <a:bodyPr>
+            <a:normAutofit fontScale="92500" lnSpcReduction="10000"/>
+          </a:bodyPr>
           <a:lstStyle/>
           <a:p>
             <a:r>
@@ -3493,11 +3495,20 @@
               <a:rPr lang="en-US" dirty="0"/>
               <a:t>Comparison between outputs of reduced and unreduced model</a:t>
             </a:r>
+            <a:r>
+              <a:rPr lang="en-US" dirty="0">
+                <a:solidFill>
+                  <a:srgbClr val="FF0000"/>
+                </a:solidFill>
+              </a:rPr>
+              <a:t> not good</a:t>
+            </a:r>
+            <a:endParaRPr lang="en-US" dirty="0"/>
           </a:p>
           <a:p>
             <a:r>
               <a:rPr lang="en-US" dirty="0"/>
-              <a:t>Model reduced model with appropriate parameters?</a:t>
+              <a:t>Model reduced model with appropriate parameters? </a:t>
             </a:r>
           </a:p>
           <a:p>
@@ -3507,6 +3518,12 @@
             </a:r>
           </a:p>
           <a:p>
+            <a:r>
+              <a:rPr lang="en-US" dirty="0"/>
+              <a:t>Maybe show some minimal model things</a:t>
+            </a:r>
+          </a:p>
+          <a:p>
             <a:endParaRPr lang="en-US" dirty="0"/>
           </a:p>
         </p:txBody>
@@ -3529,7 +3546,9 @@
         </p:nvSpPr>
         <p:spPr/>
         <p:txBody>
-          <a:bodyPr/>
+          <a:bodyPr>
+            <a:normAutofit fontScale="92500" lnSpcReduction="10000"/>
+          </a:bodyPr>
           <a:lstStyle/>
           <a:p>
             <a:r>
@@ -3580,9 +3599,13 @@
               <a:t>Gro?chemostat</a:t>
             </a:r>
             <a:r>
-              <a:rPr lang="en-US" dirty="0"/>
+              <a:rPr lang="en-US"/>
               <a:t>?</a:t>
             </a:r>
+          </a:p>
+          <a:p>
+            <a:pPr lvl="1"/>
+            <a:endParaRPr lang="en-US" dirty="0"/>
           </a:p>
           <a:p>
             <a:pPr lvl="1"/>

</xml_diff>

<commit_message>
work on interim report, abstract, and reduced model
</commit_message>
<xml_diff>
--- a/miscellaneous/presentations/20200715_syncell_mtg.pptx
+++ b/miscellaneous/presentations/20200715_syncell_mtg.pptx
@@ -2502,7 +2502,7 @@
   <dgm:whole/>
   <dgm:extLst>
     <a:ext uri="http://schemas.microsoft.com/office/drawing/2008/diagram">
-      <dsp:dataModelExt xmlns:dsp="http://schemas.microsoft.com/office/drawing/2008/diagram" relId="rId7" minVer="http://schemas.openxmlformats.org/drawingml/2006/diagram"/>
+      <dsp:dataModelExt xmlns:dsp="http://schemas.microsoft.com/office/drawing/2008/diagram" relId="rId8" minVer="http://schemas.openxmlformats.org/drawingml/2006/diagram"/>
     </a:ext>
   </dgm:extLst>
 </dgm:dataModel>
@@ -6476,7 +6476,7 @@
           <a:p>
             <a:fld id="{B102B905-3FD8-2942-AB12-6B3360B55AB8}" type="datetimeFigureOut">
               <a:rPr lang="en-US" smtClean="0"/>
-              <a:t>7/17/20</a:t>
+              <a:t>7/27/20</a:t>
             </a:fld>
             <a:endParaRPr lang="en-US"/>
           </a:p>
@@ -8066,7 +8066,7 @@
           <a:p>
             <a:fld id="{3B3400CD-7287-EA41-97B8-6C373A830532}" type="datetimeFigureOut">
               <a:rPr lang="en-US" smtClean="0"/>
-              <a:t>7/17/20</a:t>
+              <a:t>7/27/20</a:t>
             </a:fld>
             <a:endParaRPr lang="en-US"/>
           </a:p>
@@ -8264,7 +8264,7 @@
           <a:p>
             <a:fld id="{3B3400CD-7287-EA41-97B8-6C373A830532}" type="datetimeFigureOut">
               <a:rPr lang="en-US" smtClean="0"/>
-              <a:t>7/17/20</a:t>
+              <a:t>7/27/20</a:t>
             </a:fld>
             <a:endParaRPr lang="en-US"/>
           </a:p>
@@ -8472,7 +8472,7 @@
           <a:p>
             <a:fld id="{3B3400CD-7287-EA41-97B8-6C373A830532}" type="datetimeFigureOut">
               <a:rPr lang="en-US" smtClean="0"/>
-              <a:t>7/17/20</a:t>
+              <a:t>7/27/20</a:t>
             </a:fld>
             <a:endParaRPr lang="en-US"/>
           </a:p>
@@ -8672,7 +8672,7 @@
           <a:p>
             <a:fld id="{3B3400CD-7287-EA41-97B8-6C373A830532}" type="datetimeFigureOut">
               <a:rPr lang="en-US" smtClean="0"/>
-              <a:t>7/17/20</a:t>
+              <a:t>7/27/20</a:t>
             </a:fld>
             <a:endParaRPr lang="en-US"/>
           </a:p>
@@ -8947,7 +8947,7 @@
           <a:p>
             <a:fld id="{3B3400CD-7287-EA41-97B8-6C373A830532}" type="datetimeFigureOut">
               <a:rPr lang="en-US" smtClean="0"/>
-              <a:t>7/17/20</a:t>
+              <a:t>7/27/20</a:t>
             </a:fld>
             <a:endParaRPr lang="en-US"/>
           </a:p>
@@ -9212,7 +9212,7 @@
           <a:p>
             <a:fld id="{3B3400CD-7287-EA41-97B8-6C373A830532}" type="datetimeFigureOut">
               <a:rPr lang="en-US" smtClean="0"/>
-              <a:t>7/17/20</a:t>
+              <a:t>7/27/20</a:t>
             </a:fld>
             <a:endParaRPr lang="en-US"/>
           </a:p>
@@ -9624,7 +9624,7 @@
           <a:p>
             <a:fld id="{3B3400CD-7287-EA41-97B8-6C373A830532}" type="datetimeFigureOut">
               <a:rPr lang="en-US" smtClean="0"/>
-              <a:t>7/17/20</a:t>
+              <a:t>7/27/20</a:t>
             </a:fld>
             <a:endParaRPr lang="en-US"/>
           </a:p>
@@ -9765,7 +9765,7 @@
           <a:p>
             <a:fld id="{3B3400CD-7287-EA41-97B8-6C373A830532}" type="datetimeFigureOut">
               <a:rPr lang="en-US" smtClean="0"/>
-              <a:t>7/17/20</a:t>
+              <a:t>7/27/20</a:t>
             </a:fld>
             <a:endParaRPr lang="en-US"/>
           </a:p>
@@ -9878,7 +9878,7 @@
           <a:p>
             <a:fld id="{3B3400CD-7287-EA41-97B8-6C373A830532}" type="datetimeFigureOut">
               <a:rPr lang="en-US" smtClean="0"/>
-              <a:t>7/17/20</a:t>
+              <a:t>7/27/20</a:t>
             </a:fld>
             <a:endParaRPr lang="en-US"/>
           </a:p>
@@ -10189,7 +10189,7 @@
           <a:p>
             <a:fld id="{3B3400CD-7287-EA41-97B8-6C373A830532}" type="datetimeFigureOut">
               <a:rPr lang="en-US" smtClean="0"/>
-              <a:t>7/17/20</a:t>
+              <a:t>7/27/20</a:t>
             </a:fld>
             <a:endParaRPr lang="en-US"/>
           </a:p>
@@ -10480,7 +10480,7 @@
           <a:p>
             <a:fld id="{3B3400CD-7287-EA41-97B8-6C373A830532}" type="datetimeFigureOut">
               <a:rPr lang="en-US" smtClean="0"/>
-              <a:t>7/17/20</a:t>
+              <a:t>7/27/20</a:t>
             </a:fld>
             <a:endParaRPr lang="en-US"/>
           </a:p>
@@ -10723,7 +10723,7 @@
           <a:p>
             <a:fld id="{3B3400CD-7287-EA41-97B8-6C373A830532}" type="datetimeFigureOut">
               <a:rPr lang="en-US" smtClean="0"/>
-              <a:t>7/17/20</a:t>
+              <a:t>7/27/20</a:t>
             </a:fld>
             <a:endParaRPr lang="en-US"/>
           </a:p>
@@ -13604,443 +13604,6 @@
           </a:p>
         </p:txBody>
       </p:sp>
-      <p:sp>
-        <p:nvSpPr>
-          <p:cNvPr id="5" name="Oval 4">
-            <a:extLst>
-              <a:ext uri="{FF2B5EF4-FFF2-40B4-BE49-F238E27FC236}">
-                <a16:creationId xmlns:a16="http://schemas.microsoft.com/office/drawing/2014/main" id="{D10E32F9-D534-9242-80A8-B33D894CE950}"/>
-              </a:ext>
-            </a:extLst>
-          </p:cNvPr>
-          <p:cNvSpPr/>
-          <p:nvPr/>
-        </p:nvSpPr>
-        <p:spPr>
-          <a:xfrm>
-            <a:off x="1113773" y="1684329"/>
-            <a:ext cx="3429000" cy="3111500"/>
-          </a:xfrm>
-          <a:prstGeom prst="ellipse">
-            <a:avLst/>
-          </a:prstGeom>
-          <a:noFill/>
-          <a:ln w="38100">
-            <a:solidFill>
-              <a:schemeClr val="tx1"/>
-            </a:solidFill>
-            <a:prstDash val="dash"/>
-          </a:ln>
-        </p:spPr>
-        <p:style>
-          <a:lnRef idx="2">
-            <a:schemeClr val="accent1">
-              <a:shade val="50000"/>
-            </a:schemeClr>
-          </a:lnRef>
-          <a:fillRef idx="1">
-            <a:schemeClr val="accent1"/>
-          </a:fillRef>
-          <a:effectRef idx="0">
-            <a:schemeClr val="accent1"/>
-          </a:effectRef>
-          <a:fontRef idx="minor">
-            <a:schemeClr val="lt1"/>
-          </a:fontRef>
-        </p:style>
-        <p:txBody>
-          <a:bodyPr rtlCol="0" anchor="ctr"/>
-          <a:lstStyle/>
-          <a:p>
-            <a:pPr algn="ctr"/>
-            <a:endParaRPr lang="en-US"/>
-          </a:p>
-        </p:txBody>
-      </p:sp>
-      <p:sp>
-        <p:nvSpPr>
-          <p:cNvPr id="6" name="Freeform 5">
-            <a:extLst>
-              <a:ext uri="{FF2B5EF4-FFF2-40B4-BE49-F238E27FC236}">
-                <a16:creationId xmlns:a16="http://schemas.microsoft.com/office/drawing/2014/main" id="{2D8EE119-22B2-D349-A85A-8117845F82B8}"/>
-              </a:ext>
-            </a:extLst>
-          </p:cNvPr>
-          <p:cNvSpPr/>
-          <p:nvPr/>
-        </p:nvSpPr>
-        <p:spPr>
-          <a:xfrm>
-            <a:off x="3330545" y="1675335"/>
-            <a:ext cx="781664" cy="752168"/>
-          </a:xfrm>
-          <a:custGeom>
-            <a:avLst/>
-            <a:gdLst>
-              <a:gd name="connsiteX0" fmla="*/ 678425 w 781664"/>
-              <a:gd name="connsiteY0" fmla="*/ 0 h 752168"/>
-              <a:gd name="connsiteX1" fmla="*/ 294967 w 781664"/>
-              <a:gd name="connsiteY1" fmla="*/ 442451 h 752168"/>
-              <a:gd name="connsiteX2" fmla="*/ 0 w 781664"/>
-              <a:gd name="connsiteY2" fmla="*/ 427703 h 752168"/>
-              <a:gd name="connsiteX3" fmla="*/ 398206 w 781664"/>
-              <a:gd name="connsiteY3" fmla="*/ 752168 h 752168"/>
-              <a:gd name="connsiteX4" fmla="*/ 398206 w 781664"/>
-              <a:gd name="connsiteY4" fmla="*/ 545690 h 752168"/>
-              <a:gd name="connsiteX5" fmla="*/ 781664 w 781664"/>
-              <a:gd name="connsiteY5" fmla="*/ 103239 h 752168"/>
-              <a:gd name="connsiteX6" fmla="*/ 678425 w 781664"/>
-              <a:gd name="connsiteY6" fmla="*/ 0 h 752168"/>
-            </a:gdLst>
-            <a:ahLst/>
-            <a:cxnLst>
-              <a:cxn ang="0">
-                <a:pos x="connsiteX0" y="connsiteY0"/>
-              </a:cxn>
-              <a:cxn ang="0">
-                <a:pos x="connsiteX1" y="connsiteY1"/>
-              </a:cxn>
-              <a:cxn ang="0">
-                <a:pos x="connsiteX2" y="connsiteY2"/>
-              </a:cxn>
-              <a:cxn ang="0">
-                <a:pos x="connsiteX3" y="connsiteY3"/>
-              </a:cxn>
-              <a:cxn ang="0">
-                <a:pos x="connsiteX4" y="connsiteY4"/>
-              </a:cxn>
-              <a:cxn ang="0">
-                <a:pos x="connsiteX5" y="connsiteY5"/>
-              </a:cxn>
-              <a:cxn ang="0">
-                <a:pos x="connsiteX6" y="connsiteY6"/>
-              </a:cxn>
-            </a:cxnLst>
-            <a:rect l="l" t="t" r="r" b="b"/>
-            <a:pathLst>
-              <a:path w="781664" h="752168">
-                <a:moveTo>
-                  <a:pt x="678425" y="0"/>
-                </a:moveTo>
-                <a:lnTo>
-                  <a:pt x="294967" y="442451"/>
-                </a:lnTo>
-                <a:lnTo>
-                  <a:pt x="0" y="427703"/>
-                </a:lnTo>
-                <a:lnTo>
-                  <a:pt x="398206" y="752168"/>
-                </a:lnTo>
-                <a:lnTo>
-                  <a:pt x="398206" y="545690"/>
-                </a:lnTo>
-                <a:lnTo>
-                  <a:pt x="781664" y="103239"/>
-                </a:lnTo>
-                <a:lnTo>
-                  <a:pt x="678425" y="0"/>
-                </a:lnTo>
-                <a:close/>
-              </a:path>
-            </a:pathLst>
-          </a:custGeom>
-          <a:solidFill>
-            <a:schemeClr val="bg1"/>
-          </a:solidFill>
-          <a:ln w="19050">
-            <a:solidFill>
-              <a:srgbClr val="FF0000"/>
-            </a:solidFill>
-          </a:ln>
-        </p:spPr>
-        <p:style>
-          <a:lnRef idx="2">
-            <a:schemeClr val="accent1">
-              <a:shade val="50000"/>
-            </a:schemeClr>
-          </a:lnRef>
-          <a:fillRef idx="1">
-            <a:schemeClr val="accent1"/>
-          </a:fillRef>
-          <a:effectRef idx="0">
-            <a:schemeClr val="accent1"/>
-          </a:effectRef>
-          <a:fontRef idx="minor">
-            <a:schemeClr val="lt1"/>
-          </a:fontRef>
-        </p:style>
-        <p:txBody>
-          <a:bodyPr rtlCol="0" anchor="ctr"/>
-          <a:lstStyle/>
-          <a:p>
-            <a:pPr algn="ctr"/>
-            <a:endParaRPr lang="en-US"/>
-          </a:p>
-        </p:txBody>
-      </p:sp>
-      <p:sp>
-        <p:nvSpPr>
-          <p:cNvPr id="7" name="TextBox 6">
-            <a:extLst>
-              <a:ext uri="{FF2B5EF4-FFF2-40B4-BE49-F238E27FC236}">
-                <a16:creationId xmlns:a16="http://schemas.microsoft.com/office/drawing/2014/main" id="{5E33BAA6-61E8-5D4E-AC3D-B38A39DE88E2}"/>
-              </a:ext>
-            </a:extLst>
-          </p:cNvPr>
-          <p:cNvSpPr txBox="1"/>
-          <p:nvPr/>
-        </p:nvSpPr>
-        <p:spPr>
-          <a:xfrm>
-            <a:off x="2236430" y="2190265"/>
-            <a:ext cx="1193800" cy="338554"/>
-          </a:xfrm>
-          <a:prstGeom prst="rect">
-            <a:avLst/>
-          </a:prstGeom>
-          <a:noFill/>
-        </p:spPr>
-        <p:txBody>
-          <a:bodyPr wrap="square" rtlCol="0">
-            <a:spAutoFit/>
-          </a:bodyPr>
-          <a:lstStyle/>
-          <a:p>
-            <a:r>
-              <a:rPr lang="en-US" sz="1600" dirty="0">
-                <a:latin typeface="Avenir Book" panose="02000503020000020003" pitchFamily="2" charset="0"/>
-              </a:rPr>
-              <a:t>ADP + Pi</a:t>
-            </a:r>
-          </a:p>
-        </p:txBody>
-      </p:sp>
-      <p:sp>
-        <p:nvSpPr>
-          <p:cNvPr id="8" name="TextBox 7">
-            <a:extLst>
-              <a:ext uri="{FF2B5EF4-FFF2-40B4-BE49-F238E27FC236}">
-                <a16:creationId xmlns:a16="http://schemas.microsoft.com/office/drawing/2014/main" id="{4B25AF02-6736-7245-B3CC-A58C760E84CC}"/>
-              </a:ext>
-            </a:extLst>
-          </p:cNvPr>
-          <p:cNvSpPr txBox="1"/>
-          <p:nvPr/>
-        </p:nvSpPr>
-        <p:spPr>
-          <a:xfrm>
-            <a:off x="3523185" y="2636428"/>
-            <a:ext cx="588457" cy="338554"/>
-          </a:xfrm>
-          <a:prstGeom prst="rect">
-            <a:avLst/>
-          </a:prstGeom>
-          <a:noFill/>
-        </p:spPr>
-        <p:txBody>
-          <a:bodyPr wrap="square" rtlCol="0">
-            <a:spAutoFit/>
-          </a:bodyPr>
-          <a:lstStyle/>
-          <a:p>
-            <a:r>
-              <a:rPr lang="en-US" sz="1600" dirty="0">
-                <a:latin typeface="Avenir Book" panose="02000503020000020003" pitchFamily="2" charset="0"/>
-              </a:rPr>
-              <a:t>ATP</a:t>
-            </a:r>
-          </a:p>
-        </p:txBody>
-      </p:sp>
-      <p:cxnSp>
-        <p:nvCxnSpPr>
-          <p:cNvPr id="10" name="Straight Arrow Connector 9">
-            <a:extLst>
-              <a:ext uri="{FF2B5EF4-FFF2-40B4-BE49-F238E27FC236}">
-                <a16:creationId xmlns:a16="http://schemas.microsoft.com/office/drawing/2014/main" id="{E84A4E17-CCC7-5D49-8867-AF63DC2E8F9E}"/>
-              </a:ext>
-            </a:extLst>
-          </p:cNvPr>
-          <p:cNvCxnSpPr>
-            <a:cxnSpLocks/>
-          </p:cNvCxnSpPr>
-          <p:nvPr/>
-        </p:nvCxnSpPr>
-        <p:spPr>
-          <a:xfrm flipV="1">
-            <a:off x="3203298" y="1367025"/>
-            <a:ext cx="1186746" cy="1317334"/>
-          </a:xfrm>
-          <a:prstGeom prst="straightConnector1">
-            <a:avLst/>
-          </a:prstGeom>
-          <a:ln>
-            <a:tailEnd type="triangle"/>
-          </a:ln>
-        </p:spPr>
-        <p:style>
-          <a:lnRef idx="1">
-            <a:schemeClr val="dk1"/>
-          </a:lnRef>
-          <a:fillRef idx="0">
-            <a:schemeClr val="dk1"/>
-          </a:fillRef>
-          <a:effectRef idx="0">
-            <a:schemeClr val="dk1"/>
-          </a:effectRef>
-          <a:fontRef idx="minor">
-            <a:schemeClr val="tx1"/>
-          </a:fontRef>
-        </p:style>
-      </p:cxnSp>
-      <p:sp>
-        <p:nvSpPr>
-          <p:cNvPr id="11" name="TextBox 10">
-            <a:extLst>
-              <a:ext uri="{FF2B5EF4-FFF2-40B4-BE49-F238E27FC236}">
-                <a16:creationId xmlns:a16="http://schemas.microsoft.com/office/drawing/2014/main" id="{61F57610-2322-2F44-AF23-335A86CCF25B}"/>
-              </a:ext>
-            </a:extLst>
-          </p:cNvPr>
-          <p:cNvSpPr txBox="1"/>
-          <p:nvPr/>
-        </p:nvSpPr>
-        <p:spPr>
-          <a:xfrm>
-            <a:off x="4356097" y="1156345"/>
-            <a:ext cx="548532" cy="346307"/>
-          </a:xfrm>
-          <a:prstGeom prst="rect">
-            <a:avLst/>
-          </a:prstGeom>
-          <a:noFill/>
-        </p:spPr>
-        <p:txBody>
-          <a:bodyPr wrap="square" rtlCol="0">
-            <a:spAutoFit/>
-          </a:bodyPr>
-          <a:lstStyle/>
-          <a:p>
-            <a:r>
-              <a:rPr lang="en-US" sz="1600" dirty="0">
-                <a:latin typeface="Avenir Book" panose="02000503020000020003" pitchFamily="2" charset="0"/>
-              </a:rPr>
-              <a:t>H</a:t>
-            </a:r>
-            <a:r>
-              <a:rPr lang="en-US" sz="1600" baseline="30000" dirty="0">
-                <a:latin typeface="Avenir Book" panose="02000503020000020003" pitchFamily="2" charset="0"/>
-              </a:rPr>
-              <a:t>+</a:t>
-            </a:r>
-            <a:endParaRPr lang="en-US" sz="1600" dirty="0">
-              <a:latin typeface="Avenir Book" panose="02000503020000020003" pitchFamily="2" charset="0"/>
-            </a:endParaRPr>
-          </a:p>
-        </p:txBody>
-      </p:sp>
-      <p:graphicFrame>
-        <p:nvGraphicFramePr>
-          <p:cNvPr id="12" name="Diagram 11">
-            <a:extLst>
-              <a:ext uri="{FF2B5EF4-FFF2-40B4-BE49-F238E27FC236}">
-                <a16:creationId xmlns:a16="http://schemas.microsoft.com/office/drawing/2014/main" id="{B0B5E906-7C10-4C4F-B386-7DA1F3E51963}"/>
-              </a:ext>
-            </a:extLst>
-          </p:cNvPr>
-          <p:cNvGraphicFramePr/>
-          <p:nvPr/>
-        </p:nvGraphicFramePr>
-        <p:xfrm>
-          <a:off x="1507473" y="2507968"/>
-          <a:ext cx="1225550" cy="1180476"/>
-        </p:xfrm>
-        <a:graphic>
-          <a:graphicData uri="http://schemas.openxmlformats.org/drawingml/2006/diagram">
-            <dgm:relIds xmlns:dgm="http://schemas.openxmlformats.org/drawingml/2006/diagram" xmlns:r="http://schemas.openxmlformats.org/officeDocument/2006/relationships" r:dm="rId3" r:lo="rId4" r:qs="rId5" r:cs="rId6"/>
-          </a:graphicData>
-        </a:graphic>
-      </p:graphicFrame>
-      <p:sp>
-        <p:nvSpPr>
-          <p:cNvPr id="13" name="TextBox 12">
-            <a:extLst>
-              <a:ext uri="{FF2B5EF4-FFF2-40B4-BE49-F238E27FC236}">
-                <a16:creationId xmlns:a16="http://schemas.microsoft.com/office/drawing/2014/main" id="{A14AF987-A825-374E-B194-0BE07C514567}"/>
-              </a:ext>
-            </a:extLst>
-          </p:cNvPr>
-          <p:cNvSpPr txBox="1"/>
-          <p:nvPr/>
-        </p:nvSpPr>
-        <p:spPr>
-          <a:xfrm>
-            <a:off x="1728430" y="2928929"/>
-            <a:ext cx="1016000" cy="338554"/>
-          </a:xfrm>
-          <a:prstGeom prst="rect">
-            <a:avLst/>
-          </a:prstGeom>
-          <a:noFill/>
-        </p:spPr>
-        <p:txBody>
-          <a:bodyPr wrap="square" rtlCol="0">
-            <a:spAutoFit/>
-          </a:bodyPr>
-          <a:lstStyle/>
-          <a:p>
-            <a:r>
-              <a:rPr lang="en-US" sz="1600" dirty="0">
-                <a:latin typeface="Avenir Book" panose="02000503020000020003" pitchFamily="2" charset="0"/>
-              </a:rPr>
-              <a:t>TX/TL</a:t>
-            </a:r>
-          </a:p>
-        </p:txBody>
-      </p:sp>
-      <p:cxnSp>
-        <p:nvCxnSpPr>
-          <p:cNvPr id="14" name="Curved Connector 13">
-            <a:extLst>
-              <a:ext uri="{FF2B5EF4-FFF2-40B4-BE49-F238E27FC236}">
-                <a16:creationId xmlns:a16="http://schemas.microsoft.com/office/drawing/2014/main" id="{108ED97C-DD82-184C-B271-F186970C59B9}"/>
-              </a:ext>
-            </a:extLst>
-          </p:cNvPr>
-          <p:cNvCxnSpPr>
-            <a:cxnSpLocks/>
-          </p:cNvCxnSpPr>
-          <p:nvPr/>
-        </p:nvCxnSpPr>
-        <p:spPr>
-          <a:xfrm rot="5400000" flipH="1" flipV="1">
-            <a:off x="1856062" y="2391338"/>
-            <a:ext cx="478438" cy="382691"/>
-          </a:xfrm>
-          <a:prstGeom prst="curvedConnector3">
-            <a:avLst>
-              <a:gd name="adj1" fmla="val 93157"/>
-            </a:avLst>
-          </a:prstGeom>
-          <a:ln>
-            <a:tailEnd type="triangle"/>
-          </a:ln>
-        </p:spPr>
-        <p:style>
-          <a:lnRef idx="1">
-            <a:schemeClr val="dk1"/>
-          </a:lnRef>
-          <a:fillRef idx="0">
-            <a:schemeClr val="dk1"/>
-          </a:fillRef>
-          <a:effectRef idx="0">
-            <a:schemeClr val="dk1"/>
-          </a:effectRef>
-          <a:fontRef idx="minor">
-            <a:schemeClr val="tx1"/>
-          </a:fontRef>
-        </p:style>
-      </p:cxnSp>
       <p:pic>
         <p:nvPicPr>
           <p:cNvPr id="18" name="Picture 17" descr="A screenshot of a cell phone&#10;&#10;Description automatically generated">
@@ -14056,7 +13619,7 @@
           <p:nvPr/>
         </p:nvPicPr>
         <p:blipFill rotWithShape="1">
-          <a:blip r:embed="rId8"/>
+          <a:blip r:embed="rId3"/>
           <a:srcRect l="629" t="57050" r="-629" b="2984"/>
           <a:stretch/>
         </p:blipFill>
@@ -14070,48 +13633,512 @@
           </a:prstGeom>
         </p:spPr>
       </p:pic>
-      <p:cxnSp>
-        <p:nvCxnSpPr>
-          <p:cNvPr id="21" name="Curved Connector 20">
+      <p:grpSp>
+        <p:nvGrpSpPr>
+          <p:cNvPr id="3" name="Group 2">
             <a:extLst>
               <a:ext uri="{FF2B5EF4-FFF2-40B4-BE49-F238E27FC236}">
-                <a16:creationId xmlns:a16="http://schemas.microsoft.com/office/drawing/2014/main" id="{1C1E3DBB-8908-214D-8236-8B1F99753945}"/>
+                <a16:creationId xmlns:a16="http://schemas.microsoft.com/office/drawing/2014/main" id="{14123D9B-A94D-A842-ADB1-9E1A09D5E689}"/>
               </a:ext>
             </a:extLst>
           </p:cNvPr>
-          <p:cNvCxnSpPr>
-            <a:cxnSpLocks/>
-            <a:stCxn id="8" idx="0"/>
-          </p:cNvCxnSpPr>
+          <p:cNvGrpSpPr/>
           <p:nvPr/>
-        </p:nvCxnSpPr>
-        <p:spPr>
-          <a:xfrm rot="16200000" flipV="1">
-            <a:off x="3390666" y="2209680"/>
-            <a:ext cx="235618" cy="617878"/>
+        </p:nvGrpSpPr>
+        <p:grpSpPr>
+          <a:xfrm>
+            <a:off x="1113773" y="1156345"/>
+            <a:ext cx="3790856" cy="3639484"/>
+            <a:chOff x="1113773" y="1156345"/>
+            <a:chExt cx="3790856" cy="3639484"/>
           </a:xfrm>
-          <a:prstGeom prst="curvedConnector2">
-            <a:avLst/>
-          </a:prstGeom>
-          <a:ln>
-            <a:tailEnd type="triangle"/>
-          </a:ln>
-        </p:spPr>
-        <p:style>
-          <a:lnRef idx="1">
-            <a:schemeClr val="dk1"/>
-          </a:lnRef>
-          <a:fillRef idx="0">
-            <a:schemeClr val="dk1"/>
-          </a:fillRef>
-          <a:effectRef idx="0">
-            <a:schemeClr val="dk1"/>
-          </a:effectRef>
-          <a:fontRef idx="minor">
-            <a:schemeClr val="tx1"/>
-          </a:fontRef>
-        </p:style>
-      </p:cxnSp>
+        </p:grpSpPr>
+        <p:sp>
+          <p:nvSpPr>
+            <p:cNvPr id="5" name="Oval 4">
+              <a:extLst>
+                <a:ext uri="{FF2B5EF4-FFF2-40B4-BE49-F238E27FC236}">
+                  <a16:creationId xmlns:a16="http://schemas.microsoft.com/office/drawing/2014/main" id="{D10E32F9-D534-9242-80A8-B33D894CE950}"/>
+                </a:ext>
+              </a:extLst>
+            </p:cNvPr>
+            <p:cNvSpPr/>
+            <p:nvPr/>
+          </p:nvSpPr>
+          <p:spPr>
+            <a:xfrm>
+              <a:off x="1113773" y="1684329"/>
+              <a:ext cx="3429000" cy="3111500"/>
+            </a:xfrm>
+            <a:prstGeom prst="ellipse">
+              <a:avLst/>
+            </a:prstGeom>
+            <a:noFill/>
+            <a:ln w="38100">
+              <a:solidFill>
+                <a:schemeClr val="tx1"/>
+              </a:solidFill>
+              <a:prstDash val="dash"/>
+            </a:ln>
+          </p:spPr>
+          <p:style>
+            <a:lnRef idx="2">
+              <a:schemeClr val="accent1">
+                <a:shade val="50000"/>
+              </a:schemeClr>
+            </a:lnRef>
+            <a:fillRef idx="1">
+              <a:schemeClr val="accent1"/>
+            </a:fillRef>
+            <a:effectRef idx="0">
+              <a:schemeClr val="accent1"/>
+            </a:effectRef>
+            <a:fontRef idx="minor">
+              <a:schemeClr val="lt1"/>
+            </a:fontRef>
+          </p:style>
+          <p:txBody>
+            <a:bodyPr rtlCol="0" anchor="ctr"/>
+            <a:lstStyle/>
+            <a:p>
+              <a:pPr algn="ctr"/>
+              <a:endParaRPr lang="en-US"/>
+            </a:p>
+          </p:txBody>
+        </p:sp>
+        <p:sp>
+          <p:nvSpPr>
+            <p:cNvPr id="6" name="Freeform 5">
+              <a:extLst>
+                <a:ext uri="{FF2B5EF4-FFF2-40B4-BE49-F238E27FC236}">
+                  <a16:creationId xmlns:a16="http://schemas.microsoft.com/office/drawing/2014/main" id="{2D8EE119-22B2-D349-A85A-8117845F82B8}"/>
+                </a:ext>
+              </a:extLst>
+            </p:cNvPr>
+            <p:cNvSpPr/>
+            <p:nvPr/>
+          </p:nvSpPr>
+          <p:spPr>
+            <a:xfrm>
+              <a:off x="3330545" y="1675335"/>
+              <a:ext cx="781664" cy="752168"/>
+            </a:xfrm>
+            <a:custGeom>
+              <a:avLst/>
+              <a:gdLst>
+                <a:gd name="connsiteX0" fmla="*/ 678425 w 781664"/>
+                <a:gd name="connsiteY0" fmla="*/ 0 h 752168"/>
+                <a:gd name="connsiteX1" fmla="*/ 294967 w 781664"/>
+                <a:gd name="connsiteY1" fmla="*/ 442451 h 752168"/>
+                <a:gd name="connsiteX2" fmla="*/ 0 w 781664"/>
+                <a:gd name="connsiteY2" fmla="*/ 427703 h 752168"/>
+                <a:gd name="connsiteX3" fmla="*/ 398206 w 781664"/>
+                <a:gd name="connsiteY3" fmla="*/ 752168 h 752168"/>
+                <a:gd name="connsiteX4" fmla="*/ 398206 w 781664"/>
+                <a:gd name="connsiteY4" fmla="*/ 545690 h 752168"/>
+                <a:gd name="connsiteX5" fmla="*/ 781664 w 781664"/>
+                <a:gd name="connsiteY5" fmla="*/ 103239 h 752168"/>
+                <a:gd name="connsiteX6" fmla="*/ 678425 w 781664"/>
+                <a:gd name="connsiteY6" fmla="*/ 0 h 752168"/>
+              </a:gdLst>
+              <a:ahLst/>
+              <a:cxnLst>
+                <a:cxn ang="0">
+                  <a:pos x="connsiteX0" y="connsiteY0"/>
+                </a:cxn>
+                <a:cxn ang="0">
+                  <a:pos x="connsiteX1" y="connsiteY1"/>
+                </a:cxn>
+                <a:cxn ang="0">
+                  <a:pos x="connsiteX2" y="connsiteY2"/>
+                </a:cxn>
+                <a:cxn ang="0">
+                  <a:pos x="connsiteX3" y="connsiteY3"/>
+                </a:cxn>
+                <a:cxn ang="0">
+                  <a:pos x="connsiteX4" y="connsiteY4"/>
+                </a:cxn>
+                <a:cxn ang="0">
+                  <a:pos x="connsiteX5" y="connsiteY5"/>
+                </a:cxn>
+                <a:cxn ang="0">
+                  <a:pos x="connsiteX6" y="connsiteY6"/>
+                </a:cxn>
+              </a:cxnLst>
+              <a:rect l="l" t="t" r="r" b="b"/>
+              <a:pathLst>
+                <a:path w="781664" h="752168">
+                  <a:moveTo>
+                    <a:pt x="678425" y="0"/>
+                  </a:moveTo>
+                  <a:lnTo>
+                    <a:pt x="294967" y="442451"/>
+                  </a:lnTo>
+                  <a:lnTo>
+                    <a:pt x="0" y="427703"/>
+                  </a:lnTo>
+                  <a:lnTo>
+                    <a:pt x="398206" y="752168"/>
+                  </a:lnTo>
+                  <a:lnTo>
+                    <a:pt x="398206" y="545690"/>
+                  </a:lnTo>
+                  <a:lnTo>
+                    <a:pt x="781664" y="103239"/>
+                  </a:lnTo>
+                  <a:lnTo>
+                    <a:pt x="678425" y="0"/>
+                  </a:lnTo>
+                  <a:close/>
+                </a:path>
+              </a:pathLst>
+            </a:custGeom>
+            <a:solidFill>
+              <a:schemeClr val="bg1"/>
+            </a:solidFill>
+            <a:ln w="19050">
+              <a:solidFill>
+                <a:srgbClr val="FF0000"/>
+              </a:solidFill>
+            </a:ln>
+          </p:spPr>
+          <p:style>
+            <a:lnRef idx="2">
+              <a:schemeClr val="accent1">
+                <a:shade val="50000"/>
+              </a:schemeClr>
+            </a:lnRef>
+            <a:fillRef idx="1">
+              <a:schemeClr val="accent1"/>
+            </a:fillRef>
+            <a:effectRef idx="0">
+              <a:schemeClr val="accent1"/>
+            </a:effectRef>
+            <a:fontRef idx="minor">
+              <a:schemeClr val="lt1"/>
+            </a:fontRef>
+          </p:style>
+          <p:txBody>
+            <a:bodyPr rtlCol="0" anchor="ctr"/>
+            <a:lstStyle/>
+            <a:p>
+              <a:pPr algn="ctr"/>
+              <a:endParaRPr lang="en-US"/>
+            </a:p>
+          </p:txBody>
+        </p:sp>
+        <p:sp>
+          <p:nvSpPr>
+            <p:cNvPr id="7" name="TextBox 6">
+              <a:extLst>
+                <a:ext uri="{FF2B5EF4-FFF2-40B4-BE49-F238E27FC236}">
+                  <a16:creationId xmlns:a16="http://schemas.microsoft.com/office/drawing/2014/main" id="{5E33BAA6-61E8-5D4E-AC3D-B38A39DE88E2}"/>
+                </a:ext>
+              </a:extLst>
+            </p:cNvPr>
+            <p:cNvSpPr txBox="1"/>
+            <p:nvPr/>
+          </p:nvSpPr>
+          <p:spPr>
+            <a:xfrm>
+              <a:off x="2236430" y="2190265"/>
+              <a:ext cx="1193800" cy="338554"/>
+            </a:xfrm>
+            <a:prstGeom prst="rect">
+              <a:avLst/>
+            </a:prstGeom>
+            <a:noFill/>
+          </p:spPr>
+          <p:txBody>
+            <a:bodyPr wrap="square" rtlCol="0">
+              <a:spAutoFit/>
+            </a:bodyPr>
+            <a:lstStyle/>
+            <a:p>
+              <a:r>
+                <a:rPr lang="en-US" sz="1600" dirty="0">
+                  <a:latin typeface="Avenir Book" panose="02000503020000020003" pitchFamily="2" charset="0"/>
+                </a:rPr>
+                <a:t>ADP + Pi</a:t>
+              </a:r>
+            </a:p>
+          </p:txBody>
+        </p:sp>
+        <p:sp>
+          <p:nvSpPr>
+            <p:cNvPr id="8" name="TextBox 7">
+              <a:extLst>
+                <a:ext uri="{FF2B5EF4-FFF2-40B4-BE49-F238E27FC236}">
+                  <a16:creationId xmlns:a16="http://schemas.microsoft.com/office/drawing/2014/main" id="{4B25AF02-6736-7245-B3CC-A58C760E84CC}"/>
+                </a:ext>
+              </a:extLst>
+            </p:cNvPr>
+            <p:cNvSpPr txBox="1"/>
+            <p:nvPr/>
+          </p:nvSpPr>
+          <p:spPr>
+            <a:xfrm>
+              <a:off x="3523185" y="2636428"/>
+              <a:ext cx="588457" cy="338554"/>
+            </a:xfrm>
+            <a:prstGeom prst="rect">
+              <a:avLst/>
+            </a:prstGeom>
+            <a:noFill/>
+          </p:spPr>
+          <p:txBody>
+            <a:bodyPr wrap="square" rtlCol="0">
+              <a:spAutoFit/>
+            </a:bodyPr>
+            <a:lstStyle/>
+            <a:p>
+              <a:r>
+                <a:rPr lang="en-US" sz="1600" dirty="0">
+                  <a:latin typeface="Avenir Book" panose="02000503020000020003" pitchFamily="2" charset="0"/>
+                </a:rPr>
+                <a:t>ATP</a:t>
+              </a:r>
+            </a:p>
+          </p:txBody>
+        </p:sp>
+        <p:cxnSp>
+          <p:nvCxnSpPr>
+            <p:cNvPr id="10" name="Straight Arrow Connector 9">
+              <a:extLst>
+                <a:ext uri="{FF2B5EF4-FFF2-40B4-BE49-F238E27FC236}">
+                  <a16:creationId xmlns:a16="http://schemas.microsoft.com/office/drawing/2014/main" id="{E84A4E17-CCC7-5D49-8867-AF63DC2E8F9E}"/>
+                </a:ext>
+              </a:extLst>
+            </p:cNvPr>
+            <p:cNvCxnSpPr>
+              <a:cxnSpLocks/>
+            </p:cNvCxnSpPr>
+            <p:nvPr/>
+          </p:nvCxnSpPr>
+          <p:spPr>
+            <a:xfrm flipV="1">
+              <a:off x="3203298" y="1367025"/>
+              <a:ext cx="1186746" cy="1317334"/>
+            </a:xfrm>
+            <a:prstGeom prst="straightConnector1">
+              <a:avLst/>
+            </a:prstGeom>
+            <a:ln>
+              <a:tailEnd type="triangle"/>
+            </a:ln>
+          </p:spPr>
+          <p:style>
+            <a:lnRef idx="1">
+              <a:schemeClr val="dk1"/>
+            </a:lnRef>
+            <a:fillRef idx="0">
+              <a:schemeClr val="dk1"/>
+            </a:fillRef>
+            <a:effectRef idx="0">
+              <a:schemeClr val="dk1"/>
+            </a:effectRef>
+            <a:fontRef idx="minor">
+              <a:schemeClr val="tx1"/>
+            </a:fontRef>
+          </p:style>
+        </p:cxnSp>
+        <p:sp>
+          <p:nvSpPr>
+            <p:cNvPr id="11" name="TextBox 10">
+              <a:extLst>
+                <a:ext uri="{FF2B5EF4-FFF2-40B4-BE49-F238E27FC236}">
+                  <a16:creationId xmlns:a16="http://schemas.microsoft.com/office/drawing/2014/main" id="{61F57610-2322-2F44-AF23-335A86CCF25B}"/>
+                </a:ext>
+              </a:extLst>
+            </p:cNvPr>
+            <p:cNvSpPr txBox="1"/>
+            <p:nvPr/>
+          </p:nvSpPr>
+          <p:spPr>
+            <a:xfrm>
+              <a:off x="4356097" y="1156345"/>
+              <a:ext cx="548532" cy="346307"/>
+            </a:xfrm>
+            <a:prstGeom prst="rect">
+              <a:avLst/>
+            </a:prstGeom>
+            <a:noFill/>
+          </p:spPr>
+          <p:txBody>
+            <a:bodyPr wrap="square" rtlCol="0">
+              <a:spAutoFit/>
+            </a:bodyPr>
+            <a:lstStyle/>
+            <a:p>
+              <a:r>
+                <a:rPr lang="en-US" sz="1600" dirty="0">
+                  <a:latin typeface="Avenir Book" panose="02000503020000020003" pitchFamily="2" charset="0"/>
+                </a:rPr>
+                <a:t>H</a:t>
+              </a:r>
+              <a:r>
+                <a:rPr lang="en-US" sz="1600" baseline="30000" dirty="0">
+                  <a:latin typeface="Avenir Book" panose="02000503020000020003" pitchFamily="2" charset="0"/>
+                </a:rPr>
+                <a:t>+</a:t>
+              </a:r>
+              <a:endParaRPr lang="en-US" sz="1600" dirty="0">
+                <a:latin typeface="Avenir Book" panose="02000503020000020003" pitchFamily="2" charset="0"/>
+              </a:endParaRPr>
+            </a:p>
+          </p:txBody>
+        </p:sp>
+        <p:graphicFrame>
+          <p:nvGraphicFramePr>
+            <p:cNvPr id="12" name="Diagram 11">
+              <a:extLst>
+                <a:ext uri="{FF2B5EF4-FFF2-40B4-BE49-F238E27FC236}">
+                  <a16:creationId xmlns:a16="http://schemas.microsoft.com/office/drawing/2014/main" id="{B0B5E906-7C10-4C4F-B386-7DA1F3E51963}"/>
+                </a:ext>
+              </a:extLst>
+            </p:cNvPr>
+            <p:cNvGraphicFramePr/>
+            <p:nvPr>
+              <p:extLst>
+                <p:ext uri="{D42A27DB-BD31-4B8C-83A1-F6EECF244321}">
+                  <p14:modId xmlns:p14="http://schemas.microsoft.com/office/powerpoint/2010/main" val="340135400"/>
+                </p:ext>
+              </p:extLst>
+            </p:nvPr>
+          </p:nvGraphicFramePr>
+          <p:xfrm>
+            <a:off x="1507473" y="2507968"/>
+            <a:ext cx="1225550" cy="1180476"/>
+          </p:xfrm>
+          <a:graphic>
+            <a:graphicData uri="http://schemas.openxmlformats.org/drawingml/2006/diagram">
+              <dgm:relIds xmlns:dgm="http://schemas.openxmlformats.org/drawingml/2006/diagram" xmlns:r="http://schemas.openxmlformats.org/officeDocument/2006/relationships" r:dm="rId4" r:lo="rId5" r:qs="rId6" r:cs="rId7"/>
+            </a:graphicData>
+          </a:graphic>
+        </p:graphicFrame>
+        <p:sp>
+          <p:nvSpPr>
+            <p:cNvPr id="13" name="TextBox 12">
+              <a:extLst>
+                <a:ext uri="{FF2B5EF4-FFF2-40B4-BE49-F238E27FC236}">
+                  <a16:creationId xmlns:a16="http://schemas.microsoft.com/office/drawing/2014/main" id="{A14AF987-A825-374E-B194-0BE07C514567}"/>
+                </a:ext>
+              </a:extLst>
+            </p:cNvPr>
+            <p:cNvSpPr txBox="1"/>
+            <p:nvPr/>
+          </p:nvSpPr>
+          <p:spPr>
+            <a:xfrm>
+              <a:off x="1728430" y="2928929"/>
+              <a:ext cx="1016000" cy="338554"/>
+            </a:xfrm>
+            <a:prstGeom prst="rect">
+              <a:avLst/>
+            </a:prstGeom>
+            <a:noFill/>
+          </p:spPr>
+          <p:txBody>
+            <a:bodyPr wrap="square" rtlCol="0">
+              <a:spAutoFit/>
+            </a:bodyPr>
+            <a:lstStyle/>
+            <a:p>
+              <a:r>
+                <a:rPr lang="en-US" sz="1600" dirty="0">
+                  <a:latin typeface="Avenir Book" panose="02000503020000020003" pitchFamily="2" charset="0"/>
+                </a:rPr>
+                <a:t>TX/TL</a:t>
+              </a:r>
+            </a:p>
+          </p:txBody>
+        </p:sp>
+        <p:cxnSp>
+          <p:nvCxnSpPr>
+            <p:cNvPr id="14" name="Curved Connector 13">
+              <a:extLst>
+                <a:ext uri="{FF2B5EF4-FFF2-40B4-BE49-F238E27FC236}">
+                  <a16:creationId xmlns:a16="http://schemas.microsoft.com/office/drawing/2014/main" id="{108ED97C-DD82-184C-B271-F186970C59B9}"/>
+                </a:ext>
+              </a:extLst>
+            </p:cNvPr>
+            <p:cNvCxnSpPr>
+              <a:cxnSpLocks/>
+            </p:cNvCxnSpPr>
+            <p:nvPr/>
+          </p:nvCxnSpPr>
+          <p:spPr>
+            <a:xfrm rot="5400000" flipH="1" flipV="1">
+              <a:off x="1856062" y="2391338"/>
+              <a:ext cx="478438" cy="382691"/>
+            </a:xfrm>
+            <a:prstGeom prst="curvedConnector3">
+              <a:avLst>
+                <a:gd name="adj1" fmla="val 93157"/>
+              </a:avLst>
+            </a:prstGeom>
+            <a:ln>
+              <a:tailEnd type="triangle"/>
+            </a:ln>
+          </p:spPr>
+          <p:style>
+            <a:lnRef idx="1">
+              <a:schemeClr val="dk1"/>
+            </a:lnRef>
+            <a:fillRef idx="0">
+              <a:schemeClr val="dk1"/>
+            </a:fillRef>
+            <a:effectRef idx="0">
+              <a:schemeClr val="dk1"/>
+            </a:effectRef>
+            <a:fontRef idx="minor">
+              <a:schemeClr val="tx1"/>
+            </a:fontRef>
+          </p:style>
+        </p:cxnSp>
+        <p:cxnSp>
+          <p:nvCxnSpPr>
+            <p:cNvPr id="21" name="Curved Connector 20">
+              <a:extLst>
+                <a:ext uri="{FF2B5EF4-FFF2-40B4-BE49-F238E27FC236}">
+                  <a16:creationId xmlns:a16="http://schemas.microsoft.com/office/drawing/2014/main" id="{1C1E3DBB-8908-214D-8236-8B1F99753945}"/>
+                </a:ext>
+              </a:extLst>
+            </p:cNvPr>
+            <p:cNvCxnSpPr>
+              <a:cxnSpLocks/>
+              <a:stCxn id="8" idx="0"/>
+            </p:cNvCxnSpPr>
+            <p:nvPr/>
+          </p:nvCxnSpPr>
+          <p:spPr>
+            <a:xfrm rot="16200000" flipV="1">
+              <a:off x="3390666" y="2209680"/>
+              <a:ext cx="235618" cy="617878"/>
+            </a:xfrm>
+            <a:prstGeom prst="curvedConnector2">
+              <a:avLst/>
+            </a:prstGeom>
+            <a:ln>
+              <a:tailEnd type="triangle"/>
+            </a:ln>
+          </p:spPr>
+          <p:style>
+            <a:lnRef idx="1">
+              <a:schemeClr val="dk1"/>
+            </a:lnRef>
+            <a:fillRef idx="0">
+              <a:schemeClr val="dk1"/>
+            </a:fillRef>
+            <a:effectRef idx="0">
+              <a:schemeClr val="dk1"/>
+            </a:effectRef>
+            <a:fontRef idx="minor">
+              <a:schemeClr val="tx1"/>
+            </a:fontRef>
+          </p:style>
+        </p:cxnSp>
+      </p:grpSp>
       <p:grpSp>
         <p:nvGrpSpPr>
           <p:cNvPr id="33" name="Group 32">
@@ -19250,468 +19277,641 @@
           </a:p>
         </p:txBody>
       </p:sp>
-      <p:pic>
-        <p:nvPicPr>
-          <p:cNvPr id="5" name="Picture 4" descr="A close up of a mans face&#10;&#10;Description automatically generated">
+      <p:grpSp>
+        <p:nvGrpSpPr>
+          <p:cNvPr id="3" name="Group 2">
             <a:extLst>
               <a:ext uri="{FF2B5EF4-FFF2-40B4-BE49-F238E27FC236}">
-                <a16:creationId xmlns:a16="http://schemas.microsoft.com/office/drawing/2014/main" id="{2821C7BD-FE43-2840-8145-104B6200CB62}"/>
+                <a16:creationId xmlns:a16="http://schemas.microsoft.com/office/drawing/2014/main" id="{5386B640-136A-5D4F-873A-003A236BD439}"/>
               </a:ext>
             </a:extLst>
           </p:cNvPr>
-          <p:cNvPicPr>
-            <a:picLocks noChangeAspect="1"/>
-          </p:cNvPicPr>
+          <p:cNvGrpSpPr/>
           <p:nvPr/>
-        </p:nvPicPr>
-        <p:blipFill>
-          <a:blip r:embed="rId3"/>
-          <a:stretch>
-            <a:fillRect/>
-          </a:stretch>
-        </p:blipFill>
-        <p:spPr>
+        </p:nvGrpSpPr>
+        <p:grpSpPr>
           <a:xfrm>
             <a:off x="1108213" y="1274371"/>
-            <a:ext cx="4353339" cy="3200400"/>
+            <a:ext cx="9752416" cy="5116984"/>
+            <a:chOff x="1108213" y="1274371"/>
+            <a:chExt cx="9752416" cy="5116984"/>
           </a:xfrm>
-          <a:prstGeom prst="rect">
-            <a:avLst/>
-          </a:prstGeom>
-        </p:spPr>
-      </p:pic>
-      <p:pic>
-        <p:nvPicPr>
-          <p:cNvPr id="7" name="Picture 6" descr="A close up of a map&#10;&#10;Description automatically generated">
-            <a:extLst>
-              <a:ext uri="{FF2B5EF4-FFF2-40B4-BE49-F238E27FC236}">
-                <a16:creationId xmlns:a16="http://schemas.microsoft.com/office/drawing/2014/main" id="{EAED58EF-BEC5-DE4B-89F9-BC11F9871C31}"/>
-              </a:ext>
-            </a:extLst>
-          </p:cNvPr>
-          <p:cNvPicPr>
-            <a:picLocks noChangeAspect="1"/>
-          </p:cNvPicPr>
-          <p:nvPr/>
-        </p:nvPicPr>
-        <p:blipFill>
-          <a:blip r:embed="rId4"/>
-          <a:stretch>
-            <a:fillRect/>
-          </a:stretch>
-        </p:blipFill>
-        <p:spPr>
-          <a:xfrm>
-            <a:off x="6507290" y="1274371"/>
-            <a:ext cx="4353339" cy="3200400"/>
-          </a:xfrm>
-          <a:prstGeom prst="rect">
-            <a:avLst/>
-          </a:prstGeom>
-        </p:spPr>
-      </p:pic>
-      <mc:AlternateContent xmlns:mc="http://schemas.openxmlformats.org/markup-compatibility/2006" xmlns:a14="http://schemas.microsoft.com/office/drawing/2010/main">
-        <mc:Choice Requires="a14">
-          <p:sp>
-            <p:nvSpPr>
-              <p:cNvPr id="10" name="TextBox 9">
-                <a:extLst>
-                  <a:ext uri="{FF2B5EF4-FFF2-40B4-BE49-F238E27FC236}">
-                    <a16:creationId xmlns:a16="http://schemas.microsoft.com/office/drawing/2014/main" id="{0FA226FF-8519-7D4E-83A4-B7C21E5118E7}"/>
-                  </a:ext>
-                </a:extLst>
-              </p:cNvPr>
-              <p:cNvSpPr txBox="1"/>
-              <p:nvPr/>
-            </p:nvSpPr>
-            <p:spPr>
-              <a:xfrm>
-                <a:off x="1770493" y="4856485"/>
-                <a:ext cx="3028778" cy="538096"/>
-              </a:xfrm>
-              <a:prstGeom prst="rect">
-                <a:avLst/>
-              </a:prstGeom>
-              <a:noFill/>
-            </p:spPr>
-            <p:txBody>
-              <a:bodyPr wrap="none" lIns="0" tIns="0" rIns="0" bIns="0" rtlCol="0">
-                <a:spAutoFit/>
-              </a:bodyPr>
-              <a:lstStyle/>
-              <a:p>
-                <a:pPr/>
-                <a14:m>
-                  <m:oMathPara xmlns:m="http://schemas.openxmlformats.org/officeDocument/2006/math">
-                    <m:oMathParaPr>
-                      <m:jc m:val="centerGroup"/>
-                    </m:oMathParaPr>
-                    <m:oMath xmlns:m="http://schemas.openxmlformats.org/officeDocument/2006/math">
-                      <m:f>
-                        <m:fPr>
-                          <m:ctrlPr>
-                            <a:rPr lang="en-US" b="0" i="1" smtClean="0">
-                              <a:latin typeface="Cambria Math" panose="02040503050406030204" pitchFamily="18" charset="0"/>
-                            </a:rPr>
-                          </m:ctrlPr>
-                        </m:fPr>
-                        <m:num>
-                          <m:r>
-                            <a:rPr lang="en-US" b="0" i="1" smtClean="0">
-                              <a:latin typeface="Cambria Math" panose="02040503050406030204" pitchFamily="18" charset="0"/>
-                            </a:rPr>
-                            <m:t>𝑑</m:t>
-                          </m:r>
-                          <m:d>
-                            <m:dPr>
-                              <m:begChr m:val="["/>
-                              <m:endChr m:val="]"/>
-                              <m:ctrlPr>
-                                <a:rPr lang="en-US" b="0" i="1" smtClean="0">
-                                  <a:latin typeface="Cambria Math" panose="02040503050406030204" pitchFamily="18" charset="0"/>
-                                </a:rPr>
-                              </m:ctrlPr>
-                            </m:dPr>
-                            <m:e>
-                              <m:r>
-                                <a:rPr lang="en-US" b="0" i="1" smtClean="0">
-                                  <a:latin typeface="Cambria Math" panose="02040503050406030204" pitchFamily="18" charset="0"/>
-                                </a:rPr>
-                                <m:t>𝑔𝑙𝑢𝑐𝑜𝑠𝑒</m:t>
-                              </m:r>
-                            </m:e>
-                          </m:d>
-                        </m:num>
-                        <m:den>
-                          <m:r>
-                            <a:rPr lang="en-US" b="0" i="1" smtClean="0">
-                              <a:latin typeface="Cambria Math" panose="02040503050406030204" pitchFamily="18" charset="0"/>
-                            </a:rPr>
-                            <m:t>𝑑𝑡</m:t>
-                          </m:r>
-                        </m:den>
-                      </m:f>
-                      <m:r>
-                        <a:rPr lang="en-US" b="0" i="1" smtClean="0">
-                          <a:latin typeface="Cambria Math" panose="02040503050406030204" pitchFamily="18" charset="0"/>
-                        </a:rPr>
-                        <m:t>=−</m:t>
-                      </m:r>
-                      <m:sSub>
-                        <m:sSubPr>
-                          <m:ctrlPr>
-                            <a:rPr lang="en-US" b="0" i="1" smtClean="0">
-                              <a:latin typeface="Cambria Math" panose="02040503050406030204" pitchFamily="18" charset="0"/>
-                            </a:rPr>
-                          </m:ctrlPr>
-                        </m:sSubPr>
-                        <m:e>
-                          <m:r>
-                            <a:rPr lang="en-US" b="0" i="1" smtClean="0">
-                              <a:latin typeface="Cambria Math" panose="02040503050406030204" pitchFamily="18" charset="0"/>
-                            </a:rPr>
-                            <m:t>𝑘</m:t>
-                          </m:r>
-                        </m:e>
-                        <m:sub>
-                          <m:r>
-                            <a:rPr lang="en-US" b="0" i="1" smtClean="0">
-                              <a:latin typeface="Cambria Math" panose="02040503050406030204" pitchFamily="18" charset="0"/>
-                            </a:rPr>
-                            <m:t>h𝑒𝑥</m:t>
-                          </m:r>
-                        </m:sub>
-                      </m:sSub>
-                      <m:r>
-                        <a:rPr lang="en-US" b="0" i="1" smtClean="0">
-                          <a:latin typeface="Cambria Math" panose="02040503050406030204" pitchFamily="18" charset="0"/>
-                        </a:rPr>
-                        <m:t>[</m:t>
-                      </m:r>
-                      <m:r>
-                        <a:rPr lang="en-US" b="0" i="1" smtClean="0">
-                          <a:latin typeface="Cambria Math" panose="02040503050406030204" pitchFamily="18" charset="0"/>
-                        </a:rPr>
-                        <m:t>𝑔𝑙𝑢𝑐𝑜𝑠𝑒</m:t>
-                      </m:r>
-                      <m:r>
-                        <a:rPr lang="en-US" b="0" i="1" smtClean="0">
-                          <a:latin typeface="Cambria Math" panose="02040503050406030204" pitchFamily="18" charset="0"/>
-                        </a:rPr>
-                        <m:t>]</m:t>
-                      </m:r>
-                    </m:oMath>
-                  </m:oMathPara>
-                </a14:m>
-                <a:endParaRPr lang="en-US" dirty="0"/>
-              </a:p>
-            </p:txBody>
-          </p:sp>
-        </mc:Choice>
-        <mc:Fallback xmlns="">
-          <p:sp>
-            <p:nvSpPr>
-              <p:cNvPr id="10" name="TextBox 9">
-                <a:extLst>
-                  <a:ext uri="{FF2B5EF4-FFF2-40B4-BE49-F238E27FC236}">
-                    <a16:creationId xmlns:a16="http://schemas.microsoft.com/office/drawing/2014/main" id="{0FA226FF-8519-7D4E-83A4-B7C21E5118E7}"/>
-                  </a:ext>
-                </a:extLst>
-              </p:cNvPr>
-              <p:cNvSpPr txBox="1">
-                <a:spLocks noRot="1" noChangeAspect="1" noMove="1" noResize="1" noEditPoints="1" noAdjustHandles="1" noChangeArrowheads="1" noChangeShapeType="1" noTextEdit="1"/>
-              </p:cNvSpPr>
-              <p:nvPr/>
-            </p:nvSpPr>
-            <p:spPr>
-              <a:xfrm>
-                <a:off x="1770493" y="4856485"/>
-                <a:ext cx="3028778" cy="538096"/>
-              </a:xfrm>
-              <a:prstGeom prst="rect">
-                <a:avLst/>
-              </a:prstGeom>
-              <a:blipFill>
-                <a:blip r:embed="rId5"/>
-                <a:stretch>
-                  <a:fillRect l="-1250" r="-2083" b="-13636"/>
-                </a:stretch>
-              </a:blipFill>
-            </p:spPr>
-            <p:txBody>
-              <a:bodyPr/>
-              <a:lstStyle/>
-              <a:p>
-                <a:r>
-                  <a:rPr lang="en-US">
-                    <a:noFill/>
-                  </a:rPr>
-                  <a:t> </a:t>
-                </a:r>
-              </a:p>
-            </p:txBody>
-          </p:sp>
-        </mc:Fallback>
-      </mc:AlternateContent>
-      <mc:AlternateContent xmlns:mc="http://schemas.openxmlformats.org/markup-compatibility/2006" xmlns:a14="http://schemas.microsoft.com/office/drawing/2010/main">
-        <mc:Choice Requires="a14">
-          <p:sp>
-            <p:nvSpPr>
-              <p:cNvPr id="11" name="TextBox 10">
-                <a:extLst>
-                  <a:ext uri="{FF2B5EF4-FFF2-40B4-BE49-F238E27FC236}">
-                    <a16:creationId xmlns:a16="http://schemas.microsoft.com/office/drawing/2014/main" id="{B25655B0-5C53-C947-AE91-CDE2A784663F}"/>
-                  </a:ext>
-                </a:extLst>
-              </p:cNvPr>
-              <p:cNvSpPr txBox="1"/>
-              <p:nvPr/>
-            </p:nvSpPr>
-            <p:spPr>
-              <a:xfrm>
-                <a:off x="7038989" y="4646224"/>
-                <a:ext cx="3289940" cy="538096"/>
-              </a:xfrm>
-              <a:prstGeom prst="rect">
-                <a:avLst/>
-              </a:prstGeom>
-              <a:noFill/>
-            </p:spPr>
-            <p:txBody>
-              <a:bodyPr wrap="none" lIns="0" tIns="0" rIns="0" bIns="0" rtlCol="0">
-                <a:spAutoFit/>
-              </a:bodyPr>
-              <a:lstStyle/>
-              <a:p>
-                <a:pPr/>
-                <a14:m>
-                  <m:oMathPara xmlns:m="http://schemas.openxmlformats.org/officeDocument/2006/math">
-                    <m:oMathParaPr>
-                      <m:jc m:val="centerGroup"/>
-                    </m:oMathParaPr>
-                    <m:oMath xmlns:m="http://schemas.openxmlformats.org/officeDocument/2006/math">
-                      <m:f>
-                        <m:fPr>
-                          <m:ctrlPr>
-                            <a:rPr lang="en-US" b="0" i="1" smtClean="0">
-                              <a:latin typeface="Cambria Math" panose="02040503050406030204" pitchFamily="18" charset="0"/>
-                            </a:rPr>
-                          </m:ctrlPr>
-                        </m:fPr>
-                        <m:num>
-                          <m:r>
-                            <a:rPr lang="en-US" b="0" i="1" smtClean="0">
-                              <a:latin typeface="Cambria Math" panose="02040503050406030204" pitchFamily="18" charset="0"/>
-                            </a:rPr>
-                            <m:t>𝑑</m:t>
-                          </m:r>
-                          <m:d>
-                            <m:dPr>
-                              <m:begChr m:val="["/>
-                              <m:endChr m:val="]"/>
-                              <m:ctrlPr>
-                                <a:rPr lang="en-US" b="0" i="1" smtClean="0">
-                                  <a:latin typeface="Cambria Math" panose="02040503050406030204" pitchFamily="18" charset="0"/>
-                                </a:rPr>
-                              </m:ctrlPr>
-                            </m:dPr>
-                            <m:e>
-                              <m:r>
-                                <a:rPr lang="en-US" b="0" i="1" smtClean="0">
-                                  <a:latin typeface="Cambria Math" panose="02040503050406030204" pitchFamily="18" charset="0"/>
-                                </a:rPr>
-                                <m:t>𝑖𝑠𝑜𝑏𝑢𝑡𝑎𝑛𝑜𝑙</m:t>
-                              </m:r>
-                            </m:e>
-                          </m:d>
-                        </m:num>
-                        <m:den>
-                          <m:r>
-                            <a:rPr lang="en-US" b="0" i="1" smtClean="0">
-                              <a:latin typeface="Cambria Math" panose="02040503050406030204" pitchFamily="18" charset="0"/>
-                            </a:rPr>
-                            <m:t>𝑑𝑡</m:t>
-                          </m:r>
-                        </m:den>
-                      </m:f>
-                      <m:r>
-                        <a:rPr lang="en-US" b="0" i="1" smtClean="0">
-                          <a:latin typeface="Cambria Math" panose="02040503050406030204" pitchFamily="18" charset="0"/>
-                        </a:rPr>
-                        <m:t>=+</m:t>
-                      </m:r>
-                      <m:sSub>
-                        <m:sSubPr>
-                          <m:ctrlPr>
-                            <a:rPr lang="en-US" b="0" i="1" smtClean="0">
-                              <a:latin typeface="Cambria Math" panose="02040503050406030204" pitchFamily="18" charset="0"/>
-                            </a:rPr>
-                          </m:ctrlPr>
-                        </m:sSubPr>
-                        <m:e>
-                          <m:r>
-                            <a:rPr lang="en-US" b="0" i="1" smtClean="0">
-                              <a:latin typeface="Cambria Math" panose="02040503050406030204" pitchFamily="18" charset="0"/>
-                            </a:rPr>
-                            <m:t>𝑘</m:t>
-                          </m:r>
-                        </m:e>
-                        <m:sub>
-                          <m:r>
-                            <a:rPr lang="en-US" b="0" i="1" smtClean="0">
-                              <a:latin typeface="Cambria Math" panose="02040503050406030204" pitchFamily="18" charset="0"/>
-                            </a:rPr>
-                            <m:t>𝑖𝑠𝑜</m:t>
-                          </m:r>
-                        </m:sub>
-                      </m:sSub>
-                      <m:r>
-                        <a:rPr lang="en-US" b="0" i="1" smtClean="0">
-                          <a:latin typeface="Cambria Math" panose="02040503050406030204" pitchFamily="18" charset="0"/>
-                        </a:rPr>
-                        <m:t>[</m:t>
-                      </m:r>
-                      <m:r>
-                        <a:rPr lang="en-US" b="0" i="1" smtClean="0">
-                          <a:latin typeface="Cambria Math" panose="02040503050406030204" pitchFamily="18" charset="0"/>
-                        </a:rPr>
-                        <m:t>𝑔𝑙𝑢𝑐𝑜𝑠𝑒</m:t>
-                      </m:r>
-                      <m:r>
-                        <a:rPr lang="en-US" b="0" i="1" smtClean="0">
-                          <a:latin typeface="Cambria Math" panose="02040503050406030204" pitchFamily="18" charset="0"/>
-                        </a:rPr>
-                        <m:t>]</m:t>
-                      </m:r>
-                    </m:oMath>
-                  </m:oMathPara>
-                </a14:m>
-                <a:endParaRPr lang="en-US" dirty="0"/>
-              </a:p>
-            </p:txBody>
-          </p:sp>
-        </mc:Choice>
-        <mc:Fallback xmlns="">
-          <p:sp>
-            <p:nvSpPr>
-              <p:cNvPr id="11" name="TextBox 10">
-                <a:extLst>
-                  <a:ext uri="{FF2B5EF4-FFF2-40B4-BE49-F238E27FC236}">
-                    <a16:creationId xmlns:a16="http://schemas.microsoft.com/office/drawing/2014/main" id="{B25655B0-5C53-C947-AE91-CDE2A784663F}"/>
-                  </a:ext>
-                </a:extLst>
-              </p:cNvPr>
-              <p:cNvSpPr txBox="1">
-                <a:spLocks noRot="1" noChangeAspect="1" noMove="1" noResize="1" noEditPoints="1" noAdjustHandles="1" noChangeArrowheads="1" noChangeShapeType="1" noTextEdit="1"/>
-              </p:cNvSpPr>
-              <p:nvPr/>
-            </p:nvSpPr>
-            <p:spPr>
-              <a:xfrm>
-                <a:off x="7038989" y="4646224"/>
-                <a:ext cx="3289940" cy="538096"/>
-              </a:xfrm>
-              <a:prstGeom prst="rect">
-                <a:avLst/>
-              </a:prstGeom>
-              <a:blipFill>
-                <a:blip r:embed="rId6"/>
-                <a:stretch>
-                  <a:fillRect l="-769" r="-1923" b="-13953"/>
-                </a:stretch>
-              </a:blipFill>
-            </p:spPr>
-            <p:txBody>
-              <a:bodyPr/>
-              <a:lstStyle/>
-              <a:p>
-                <a:r>
-                  <a:rPr lang="en-US">
-                    <a:noFill/>
-                  </a:rPr>
-                  <a:t> </a:t>
-                </a:r>
-              </a:p>
-            </p:txBody>
-          </p:sp>
-        </mc:Fallback>
-      </mc:AlternateContent>
-      <mc:AlternateContent xmlns:mc="http://schemas.openxmlformats.org/markup-compatibility/2006" xmlns:a14="http://schemas.microsoft.com/office/drawing/2010/main">
-        <mc:Choice Requires="a14">
-          <p:sp>
-            <p:nvSpPr>
-              <p:cNvPr id="12" name="TextBox 11">
-                <a:extLst>
-                  <a:ext uri="{FF2B5EF4-FFF2-40B4-BE49-F238E27FC236}">
-                    <a16:creationId xmlns:a16="http://schemas.microsoft.com/office/drawing/2014/main" id="{8F7DFFA2-8069-9249-9CFF-24A014ED29EE}"/>
-                  </a:ext>
-                </a:extLst>
-              </p:cNvPr>
-              <p:cNvSpPr txBox="1"/>
-              <p:nvPr/>
-            </p:nvSpPr>
-            <p:spPr>
-              <a:xfrm>
-                <a:off x="7627321" y="5628283"/>
-                <a:ext cx="2113271" cy="219227"/>
-              </a:xfrm>
-              <a:prstGeom prst="rect">
-                <a:avLst/>
-              </a:prstGeom>
-              <a:noFill/>
-            </p:spPr>
-            <p:txBody>
-              <a:bodyPr wrap="none" lIns="0" tIns="0" rIns="0" bIns="0" rtlCol="0">
-                <a:spAutoFit/>
-              </a:bodyPr>
-              <a:lstStyle/>
-              <a:p>
-                <a:pPr/>
-                <a14:m>
-                  <m:oMathPara xmlns:m="http://schemas.openxmlformats.org/officeDocument/2006/math">
-                    <m:oMathParaPr>
-                      <m:jc m:val="centerGroup"/>
-                    </m:oMathParaPr>
+        </p:grpSpPr>
+        <p:pic>
+          <p:nvPicPr>
+            <p:cNvPr id="5" name="Picture 4" descr="A close up of a mans face&#10;&#10;Description automatically generated">
+              <a:extLst>
+                <a:ext uri="{FF2B5EF4-FFF2-40B4-BE49-F238E27FC236}">
+                  <a16:creationId xmlns:a16="http://schemas.microsoft.com/office/drawing/2014/main" id="{2821C7BD-FE43-2840-8145-104B6200CB62}"/>
+                </a:ext>
+              </a:extLst>
+            </p:cNvPr>
+            <p:cNvPicPr>
+              <a:picLocks noChangeAspect="1"/>
+            </p:cNvPicPr>
+            <p:nvPr/>
+          </p:nvPicPr>
+          <p:blipFill>
+            <a:blip r:embed="rId3"/>
+            <a:stretch>
+              <a:fillRect/>
+            </a:stretch>
+          </p:blipFill>
+          <p:spPr>
+            <a:xfrm>
+              <a:off x="1108213" y="1274371"/>
+              <a:ext cx="4353339" cy="3200400"/>
+            </a:xfrm>
+            <a:prstGeom prst="rect">
+              <a:avLst/>
+            </a:prstGeom>
+          </p:spPr>
+        </p:pic>
+        <p:pic>
+          <p:nvPicPr>
+            <p:cNvPr id="7" name="Picture 6" descr="A close up of a map&#10;&#10;Description automatically generated">
+              <a:extLst>
+                <a:ext uri="{FF2B5EF4-FFF2-40B4-BE49-F238E27FC236}">
+                  <a16:creationId xmlns:a16="http://schemas.microsoft.com/office/drawing/2014/main" id="{EAED58EF-BEC5-DE4B-89F9-BC11F9871C31}"/>
+                </a:ext>
+              </a:extLst>
+            </p:cNvPr>
+            <p:cNvPicPr>
+              <a:picLocks noChangeAspect="1"/>
+            </p:cNvPicPr>
+            <p:nvPr/>
+          </p:nvPicPr>
+          <p:blipFill>
+            <a:blip r:embed="rId4"/>
+            <a:stretch>
+              <a:fillRect/>
+            </a:stretch>
+          </p:blipFill>
+          <p:spPr>
+            <a:xfrm>
+              <a:off x="6507290" y="1274371"/>
+              <a:ext cx="4353339" cy="3200400"/>
+            </a:xfrm>
+            <a:prstGeom prst="rect">
+              <a:avLst/>
+            </a:prstGeom>
+          </p:spPr>
+        </p:pic>
+        <mc:AlternateContent xmlns:mc="http://schemas.openxmlformats.org/markup-compatibility/2006">
+          <mc:Choice xmlns:a14="http://schemas.microsoft.com/office/drawing/2010/main" Requires="a14">
+            <p:sp>
+              <p:nvSpPr>
+                <p:cNvPr id="10" name="TextBox 9">
+                  <a:extLst>
+                    <a:ext uri="{FF2B5EF4-FFF2-40B4-BE49-F238E27FC236}">
+                      <a16:creationId xmlns:a16="http://schemas.microsoft.com/office/drawing/2014/main" id="{0FA226FF-8519-7D4E-83A4-B7C21E5118E7}"/>
+                    </a:ext>
+                  </a:extLst>
+                </p:cNvPr>
+                <p:cNvSpPr txBox="1"/>
+                <p:nvPr/>
+              </p:nvSpPr>
+              <p:spPr>
+                <a:xfrm>
+                  <a:off x="1770493" y="4856485"/>
+                  <a:ext cx="3028778" cy="538096"/>
+                </a:xfrm>
+                <a:prstGeom prst="rect">
+                  <a:avLst/>
+                </a:prstGeom>
+                <a:noFill/>
+              </p:spPr>
+              <p:txBody>
+                <a:bodyPr wrap="none" lIns="0" tIns="0" rIns="0" bIns="0" rtlCol="0">
+                  <a:spAutoFit/>
+                </a:bodyPr>
+                <a:lstStyle/>
+                <a:p>
+                  <a:pPr/>
+                  <a14:m>
+                    <m:oMathPara xmlns:m="http://schemas.openxmlformats.org/officeDocument/2006/math">
+                      <m:oMathParaPr>
+                        <m:jc m:val="centerGroup"/>
+                      </m:oMathParaPr>
+                      <m:oMath xmlns:m="http://schemas.openxmlformats.org/officeDocument/2006/math">
+                        <m:f>
+                          <m:fPr>
+                            <m:ctrlPr>
+                              <a:rPr lang="en-US" b="0" i="1" smtClean="0">
+                                <a:latin typeface="Cambria Math" panose="02040503050406030204" pitchFamily="18" charset="0"/>
+                              </a:rPr>
+                            </m:ctrlPr>
+                          </m:fPr>
+                          <m:num>
+                            <m:r>
+                              <a:rPr lang="en-US" b="0" i="1" smtClean="0">
+                                <a:latin typeface="Cambria Math" panose="02040503050406030204" pitchFamily="18" charset="0"/>
+                              </a:rPr>
+                              <m:t>𝑑</m:t>
+                            </m:r>
+                            <m:d>
+                              <m:dPr>
+                                <m:begChr m:val="["/>
+                                <m:endChr m:val="]"/>
+                                <m:ctrlPr>
+                                  <a:rPr lang="en-US" b="0" i="1" smtClean="0">
+                                    <a:latin typeface="Cambria Math" panose="02040503050406030204" pitchFamily="18" charset="0"/>
+                                  </a:rPr>
+                                </m:ctrlPr>
+                              </m:dPr>
+                              <m:e>
+                                <m:r>
+                                  <a:rPr lang="en-US" b="0" i="1" smtClean="0">
+                                    <a:latin typeface="Cambria Math" panose="02040503050406030204" pitchFamily="18" charset="0"/>
+                                  </a:rPr>
+                                  <m:t>𝑔𝑙𝑢𝑐𝑜𝑠𝑒</m:t>
+                                </m:r>
+                              </m:e>
+                            </m:d>
+                          </m:num>
+                          <m:den>
+                            <m:r>
+                              <a:rPr lang="en-US" b="0" i="1" smtClean="0">
+                                <a:latin typeface="Cambria Math" panose="02040503050406030204" pitchFamily="18" charset="0"/>
+                              </a:rPr>
+                              <m:t>𝑑𝑡</m:t>
+                            </m:r>
+                          </m:den>
+                        </m:f>
+                        <m:r>
+                          <a:rPr lang="en-US" b="0" i="1" smtClean="0">
+                            <a:latin typeface="Cambria Math" panose="02040503050406030204" pitchFamily="18" charset="0"/>
+                          </a:rPr>
+                          <m:t>=−</m:t>
+                        </m:r>
+                        <m:sSub>
+                          <m:sSubPr>
+                            <m:ctrlPr>
+                              <a:rPr lang="en-US" b="0" i="1" smtClean="0">
+                                <a:latin typeface="Cambria Math" panose="02040503050406030204" pitchFamily="18" charset="0"/>
+                              </a:rPr>
+                            </m:ctrlPr>
+                          </m:sSubPr>
+                          <m:e>
+                            <m:r>
+                              <a:rPr lang="en-US" b="0" i="1" smtClean="0">
+                                <a:latin typeface="Cambria Math" panose="02040503050406030204" pitchFamily="18" charset="0"/>
+                              </a:rPr>
+                              <m:t>𝑘</m:t>
+                            </m:r>
+                          </m:e>
+                          <m:sub>
+                            <m:r>
+                              <a:rPr lang="en-US" b="0" i="1" smtClean="0">
+                                <a:latin typeface="Cambria Math" panose="02040503050406030204" pitchFamily="18" charset="0"/>
+                              </a:rPr>
+                              <m:t>h𝑒𝑥</m:t>
+                            </m:r>
+                          </m:sub>
+                        </m:sSub>
+                        <m:r>
+                          <a:rPr lang="en-US" b="0" i="1" smtClean="0">
+                            <a:latin typeface="Cambria Math" panose="02040503050406030204" pitchFamily="18" charset="0"/>
+                          </a:rPr>
+                          <m:t>[</m:t>
+                        </m:r>
+                        <m:r>
+                          <a:rPr lang="en-US" b="0" i="1" smtClean="0">
+                            <a:latin typeface="Cambria Math" panose="02040503050406030204" pitchFamily="18" charset="0"/>
+                          </a:rPr>
+                          <m:t>𝑔𝑙𝑢𝑐𝑜𝑠𝑒</m:t>
+                        </m:r>
+                        <m:r>
+                          <a:rPr lang="en-US" b="0" i="1" smtClean="0">
+                            <a:latin typeface="Cambria Math" panose="02040503050406030204" pitchFamily="18" charset="0"/>
+                          </a:rPr>
+                          <m:t>]</m:t>
+                        </m:r>
+                      </m:oMath>
+                    </m:oMathPara>
+                  </a14:m>
+                  <a:endParaRPr lang="en-US" dirty="0"/>
+                </a:p>
+              </p:txBody>
+            </p:sp>
+          </mc:Choice>
+          <mc:Fallback>
+            <p:sp>
+              <p:nvSpPr>
+                <p:cNvPr id="10" name="TextBox 9">
+                  <a:extLst>
+                    <a:ext uri="{FF2B5EF4-FFF2-40B4-BE49-F238E27FC236}">
+                      <a16:creationId xmlns:a16="http://schemas.microsoft.com/office/drawing/2014/main" id="{0FA226FF-8519-7D4E-83A4-B7C21E5118E7}"/>
+                    </a:ext>
+                  </a:extLst>
+                </p:cNvPr>
+                <p:cNvSpPr txBox="1">
+                  <a:spLocks noRot="1" noChangeAspect="1" noMove="1" noResize="1" noEditPoints="1" noAdjustHandles="1" noChangeArrowheads="1" noChangeShapeType="1" noTextEdit="1"/>
+                </p:cNvSpPr>
+                <p:nvPr/>
+              </p:nvSpPr>
+              <p:spPr>
+                <a:xfrm>
+                  <a:off x="1770493" y="4856485"/>
+                  <a:ext cx="3028778" cy="538096"/>
+                </a:xfrm>
+                <a:prstGeom prst="rect">
+                  <a:avLst/>
+                </a:prstGeom>
+                <a:blipFill>
+                  <a:blip r:embed="rId5"/>
+                  <a:stretch>
+                    <a:fillRect l="-1250" r="-2083" b="-13636"/>
+                  </a:stretch>
+                </a:blipFill>
+              </p:spPr>
+              <p:txBody>
+                <a:bodyPr/>
+                <a:lstStyle/>
+                <a:p>
+                  <a:r>
+                    <a:rPr lang="en-US">
+                      <a:noFill/>
+                    </a:rPr>
+                    <a:t> </a:t>
+                  </a:r>
+                </a:p>
+              </p:txBody>
+            </p:sp>
+          </mc:Fallback>
+        </mc:AlternateContent>
+        <mc:AlternateContent xmlns:mc="http://schemas.openxmlformats.org/markup-compatibility/2006">
+          <mc:Choice xmlns:a14="http://schemas.microsoft.com/office/drawing/2010/main" Requires="a14">
+            <p:sp>
+              <p:nvSpPr>
+                <p:cNvPr id="11" name="TextBox 10">
+                  <a:extLst>
+                    <a:ext uri="{FF2B5EF4-FFF2-40B4-BE49-F238E27FC236}">
+                      <a16:creationId xmlns:a16="http://schemas.microsoft.com/office/drawing/2014/main" id="{B25655B0-5C53-C947-AE91-CDE2A784663F}"/>
+                    </a:ext>
+                  </a:extLst>
+                </p:cNvPr>
+                <p:cNvSpPr txBox="1"/>
+                <p:nvPr/>
+              </p:nvSpPr>
+              <p:spPr>
+                <a:xfrm>
+                  <a:off x="7038989" y="4646224"/>
+                  <a:ext cx="3289940" cy="538096"/>
+                </a:xfrm>
+                <a:prstGeom prst="rect">
+                  <a:avLst/>
+                </a:prstGeom>
+                <a:noFill/>
+              </p:spPr>
+              <p:txBody>
+                <a:bodyPr wrap="none" lIns="0" tIns="0" rIns="0" bIns="0" rtlCol="0">
+                  <a:spAutoFit/>
+                </a:bodyPr>
+                <a:lstStyle/>
+                <a:p>
+                  <a:pPr/>
+                  <a14:m>
+                    <m:oMathPara xmlns:m="http://schemas.openxmlformats.org/officeDocument/2006/math">
+                      <m:oMathParaPr>
+                        <m:jc m:val="centerGroup"/>
+                      </m:oMathParaPr>
+                      <m:oMath xmlns:m="http://schemas.openxmlformats.org/officeDocument/2006/math">
+                        <m:f>
+                          <m:fPr>
+                            <m:ctrlPr>
+                              <a:rPr lang="en-US" b="0" i="1" smtClean="0">
+                                <a:latin typeface="Cambria Math" panose="02040503050406030204" pitchFamily="18" charset="0"/>
+                              </a:rPr>
+                            </m:ctrlPr>
+                          </m:fPr>
+                          <m:num>
+                            <m:r>
+                              <a:rPr lang="en-US" b="0" i="1" smtClean="0">
+                                <a:latin typeface="Cambria Math" panose="02040503050406030204" pitchFamily="18" charset="0"/>
+                              </a:rPr>
+                              <m:t>𝑑</m:t>
+                            </m:r>
+                            <m:d>
+                              <m:dPr>
+                                <m:begChr m:val="["/>
+                                <m:endChr m:val="]"/>
+                                <m:ctrlPr>
+                                  <a:rPr lang="en-US" b="0" i="1" smtClean="0">
+                                    <a:latin typeface="Cambria Math" panose="02040503050406030204" pitchFamily="18" charset="0"/>
+                                  </a:rPr>
+                                </m:ctrlPr>
+                              </m:dPr>
+                              <m:e>
+                                <m:r>
+                                  <a:rPr lang="en-US" b="0" i="1" smtClean="0">
+                                    <a:latin typeface="Cambria Math" panose="02040503050406030204" pitchFamily="18" charset="0"/>
+                                  </a:rPr>
+                                  <m:t>𝑖𝑠𝑜𝑏𝑢𝑡𝑎𝑛𝑜𝑙</m:t>
+                                </m:r>
+                              </m:e>
+                            </m:d>
+                          </m:num>
+                          <m:den>
+                            <m:r>
+                              <a:rPr lang="en-US" b="0" i="1" smtClean="0">
+                                <a:latin typeface="Cambria Math" panose="02040503050406030204" pitchFamily="18" charset="0"/>
+                              </a:rPr>
+                              <m:t>𝑑𝑡</m:t>
+                            </m:r>
+                          </m:den>
+                        </m:f>
+                        <m:r>
+                          <a:rPr lang="en-US" b="0" i="1" smtClean="0">
+                            <a:latin typeface="Cambria Math" panose="02040503050406030204" pitchFamily="18" charset="0"/>
+                          </a:rPr>
+                          <m:t>=+</m:t>
+                        </m:r>
+                        <m:sSub>
+                          <m:sSubPr>
+                            <m:ctrlPr>
+                              <a:rPr lang="en-US" b="0" i="1" smtClean="0">
+                                <a:latin typeface="Cambria Math" panose="02040503050406030204" pitchFamily="18" charset="0"/>
+                              </a:rPr>
+                            </m:ctrlPr>
+                          </m:sSubPr>
+                          <m:e>
+                            <m:r>
+                              <a:rPr lang="en-US" b="0" i="1" smtClean="0">
+                                <a:latin typeface="Cambria Math" panose="02040503050406030204" pitchFamily="18" charset="0"/>
+                              </a:rPr>
+                              <m:t>𝑘</m:t>
+                            </m:r>
+                          </m:e>
+                          <m:sub>
+                            <m:r>
+                              <a:rPr lang="en-US" b="0" i="1" smtClean="0">
+                                <a:latin typeface="Cambria Math" panose="02040503050406030204" pitchFamily="18" charset="0"/>
+                              </a:rPr>
+                              <m:t>𝑖𝑠𝑜</m:t>
+                            </m:r>
+                          </m:sub>
+                        </m:sSub>
+                        <m:r>
+                          <a:rPr lang="en-US" b="0" i="1" smtClean="0">
+                            <a:latin typeface="Cambria Math" panose="02040503050406030204" pitchFamily="18" charset="0"/>
+                          </a:rPr>
+                          <m:t>[</m:t>
+                        </m:r>
+                        <m:r>
+                          <a:rPr lang="en-US" b="0" i="1" smtClean="0">
+                            <a:latin typeface="Cambria Math" panose="02040503050406030204" pitchFamily="18" charset="0"/>
+                          </a:rPr>
+                          <m:t>𝑔𝑙𝑢𝑐𝑜𝑠𝑒</m:t>
+                        </m:r>
+                        <m:r>
+                          <a:rPr lang="en-US" b="0" i="1" smtClean="0">
+                            <a:latin typeface="Cambria Math" panose="02040503050406030204" pitchFamily="18" charset="0"/>
+                          </a:rPr>
+                          <m:t>]</m:t>
+                        </m:r>
+                      </m:oMath>
+                    </m:oMathPara>
+                  </a14:m>
+                  <a:endParaRPr lang="en-US" dirty="0"/>
+                </a:p>
+              </p:txBody>
+            </p:sp>
+          </mc:Choice>
+          <mc:Fallback>
+            <p:sp>
+              <p:nvSpPr>
+                <p:cNvPr id="11" name="TextBox 10">
+                  <a:extLst>
+                    <a:ext uri="{FF2B5EF4-FFF2-40B4-BE49-F238E27FC236}">
+                      <a16:creationId xmlns:a16="http://schemas.microsoft.com/office/drawing/2014/main" id="{B25655B0-5C53-C947-AE91-CDE2A784663F}"/>
+                    </a:ext>
+                  </a:extLst>
+                </p:cNvPr>
+                <p:cNvSpPr txBox="1">
+                  <a:spLocks noRot="1" noChangeAspect="1" noMove="1" noResize="1" noEditPoints="1" noAdjustHandles="1" noChangeArrowheads="1" noChangeShapeType="1" noTextEdit="1"/>
+                </p:cNvSpPr>
+                <p:nvPr/>
+              </p:nvSpPr>
+              <p:spPr>
+                <a:xfrm>
+                  <a:off x="7038989" y="4646224"/>
+                  <a:ext cx="3289940" cy="538096"/>
+                </a:xfrm>
+                <a:prstGeom prst="rect">
+                  <a:avLst/>
+                </a:prstGeom>
+                <a:blipFill>
+                  <a:blip r:embed="rId6"/>
+                  <a:stretch>
+                    <a:fillRect l="-769" r="-1923" b="-13953"/>
+                  </a:stretch>
+                </a:blipFill>
+              </p:spPr>
+              <p:txBody>
+                <a:bodyPr/>
+                <a:lstStyle/>
+                <a:p>
+                  <a:r>
+                    <a:rPr lang="en-US">
+                      <a:noFill/>
+                    </a:rPr>
+                    <a:t> </a:t>
+                  </a:r>
+                </a:p>
+              </p:txBody>
+            </p:sp>
+          </mc:Fallback>
+        </mc:AlternateContent>
+        <mc:AlternateContent xmlns:mc="http://schemas.openxmlformats.org/markup-compatibility/2006">
+          <mc:Choice xmlns:a14="http://schemas.microsoft.com/office/drawing/2010/main" Requires="a14">
+            <p:sp>
+              <p:nvSpPr>
+                <p:cNvPr id="12" name="TextBox 11">
+                  <a:extLst>
+                    <a:ext uri="{FF2B5EF4-FFF2-40B4-BE49-F238E27FC236}">
+                      <a16:creationId xmlns:a16="http://schemas.microsoft.com/office/drawing/2014/main" id="{8F7DFFA2-8069-9249-9CFF-24A014ED29EE}"/>
+                    </a:ext>
+                  </a:extLst>
+                </p:cNvPr>
+                <p:cNvSpPr txBox="1"/>
+                <p:nvPr/>
+              </p:nvSpPr>
+              <p:spPr>
+                <a:xfrm>
+                  <a:off x="7627321" y="5628283"/>
+                  <a:ext cx="2113271" cy="219227"/>
+                </a:xfrm>
+                <a:prstGeom prst="rect">
+                  <a:avLst/>
+                </a:prstGeom>
+                <a:noFill/>
+              </p:spPr>
+              <p:txBody>
+                <a:bodyPr wrap="none" lIns="0" tIns="0" rIns="0" bIns="0" rtlCol="0">
+                  <a:spAutoFit/>
+                </a:bodyPr>
+                <a:lstStyle/>
+                <a:p>
+                  <a:pPr/>
+                  <a14:m>
+                    <m:oMathPara xmlns:m="http://schemas.openxmlformats.org/officeDocument/2006/math">
+                      <m:oMathParaPr>
+                        <m:jc m:val="centerGroup"/>
+                      </m:oMathParaPr>
+                      <m:oMath xmlns:m="http://schemas.openxmlformats.org/officeDocument/2006/math">
+                        <m:r>
+                          <a:rPr lang="en-US" sz="1400" b="0" i="1" smtClean="0">
+                            <a:latin typeface="Cambria Math" panose="02040503050406030204" pitchFamily="18" charset="0"/>
+                          </a:rPr>
+                          <m:t>𝑔𝑙𝑢𝑐𝑜𝑠𝑒</m:t>
+                        </m:r>
+                        <m:r>
+                          <a:rPr lang="en-US" sz="1400" b="0" i="1" smtClean="0">
+                            <a:latin typeface="Cambria Math" panose="02040503050406030204" pitchFamily="18" charset="0"/>
+                          </a:rPr>
+                          <m:t> </m:t>
+                        </m:r>
+                        <m:sSup>
+                          <m:sSupPr>
+                            <m:ctrlPr>
+                              <a:rPr lang="en-US" sz="1400" b="0" i="1" smtClean="0">
+                                <a:latin typeface="Cambria Math" panose="02040503050406030204" pitchFamily="18" charset="0"/>
+                              </a:rPr>
+                            </m:ctrlPr>
+                          </m:sSupPr>
+                          <m:e>
+                            <m:r>
+                              <a:rPr lang="en-US" sz="1400" b="0" i="1" smtClean="0">
+                                <a:latin typeface="Cambria Math" panose="02040503050406030204" pitchFamily="18" charset="0"/>
+                              </a:rPr>
+                              <m:t>→</m:t>
+                            </m:r>
+                          </m:e>
+                          <m:sup>
+                            <m:sSub>
+                              <m:sSubPr>
+                                <m:ctrlPr>
+                                  <a:rPr lang="en-US" sz="1400" b="0" i="1" smtClean="0">
+                                    <a:latin typeface="Cambria Math" panose="02040503050406030204" pitchFamily="18" charset="0"/>
+                                  </a:rPr>
+                                </m:ctrlPr>
+                              </m:sSubPr>
+                              <m:e>
+                                <m:r>
+                                  <a:rPr lang="en-US" sz="1400" b="0" i="1" smtClean="0">
+                                    <a:latin typeface="Cambria Math" panose="02040503050406030204" pitchFamily="18" charset="0"/>
+                                  </a:rPr>
+                                  <m:t>𝑘</m:t>
+                                </m:r>
+                              </m:e>
+                              <m:sub>
+                                <m:r>
+                                  <a:rPr lang="en-US" sz="1400" b="0" i="1" smtClean="0">
+                                    <a:latin typeface="Cambria Math" panose="02040503050406030204" pitchFamily="18" charset="0"/>
+                                  </a:rPr>
+                                  <m:t>𝑖𝑠𝑜</m:t>
+                                </m:r>
+                              </m:sub>
+                            </m:sSub>
+                          </m:sup>
+                        </m:sSup>
+                        <m:r>
+                          <a:rPr lang="en-US" sz="1400" b="0" i="1" smtClean="0">
+                            <a:latin typeface="Cambria Math" panose="02040503050406030204" pitchFamily="18" charset="0"/>
+                          </a:rPr>
+                          <m:t>𝑖𝑠𝑜𝑏𝑢𝑡𝑎𝑛𝑜𝑙</m:t>
+                        </m:r>
+                        <m:r>
+                          <a:rPr lang="en-US" sz="1400" b="0" i="1" smtClean="0">
+                            <a:latin typeface="Cambria Math" panose="02040503050406030204" pitchFamily="18" charset="0"/>
+                          </a:rPr>
+                          <m:t> </m:t>
+                        </m:r>
+                      </m:oMath>
+                    </m:oMathPara>
+                  </a14:m>
+                  <a:endParaRPr lang="en-US" sz="1400" dirty="0"/>
+                </a:p>
+              </p:txBody>
+            </p:sp>
+          </mc:Choice>
+          <mc:Fallback>
+            <p:sp>
+              <p:nvSpPr>
+                <p:cNvPr id="12" name="TextBox 11">
+                  <a:extLst>
+                    <a:ext uri="{FF2B5EF4-FFF2-40B4-BE49-F238E27FC236}">
+                      <a16:creationId xmlns:a16="http://schemas.microsoft.com/office/drawing/2014/main" id="{8F7DFFA2-8069-9249-9CFF-24A014ED29EE}"/>
+                    </a:ext>
+                  </a:extLst>
+                </p:cNvPr>
+                <p:cNvSpPr txBox="1">
+                  <a:spLocks noRot="1" noChangeAspect="1" noMove="1" noResize="1" noEditPoints="1" noAdjustHandles="1" noChangeArrowheads="1" noChangeShapeType="1" noTextEdit="1"/>
+                </p:cNvSpPr>
+                <p:nvPr/>
+              </p:nvSpPr>
+              <p:spPr>
+                <a:xfrm>
+                  <a:off x="7627321" y="5628283"/>
+                  <a:ext cx="2113271" cy="219227"/>
+                </a:xfrm>
+                <a:prstGeom prst="rect">
+                  <a:avLst/>
+                </a:prstGeom>
+                <a:blipFill>
+                  <a:blip r:embed="rId7"/>
+                  <a:stretch>
+                    <a:fillRect l="-2395" r="-2395" b="-38889"/>
+                  </a:stretch>
+                </a:blipFill>
+              </p:spPr>
+              <p:txBody>
+                <a:bodyPr/>
+                <a:lstStyle/>
+                <a:p>
+                  <a:r>
+                    <a:rPr lang="en-US">
+                      <a:noFill/>
+                    </a:rPr>
+                    <a:t> </a:t>
+                  </a:r>
+                </a:p>
+              </p:txBody>
+            </p:sp>
+          </mc:Fallback>
+        </mc:AlternateContent>
+        <mc:AlternateContent xmlns:mc="http://schemas.openxmlformats.org/markup-compatibility/2006">
+          <mc:Choice xmlns:a14="http://schemas.microsoft.com/office/drawing/2010/main" Requires="a14">
+            <p:sp>
+              <p:nvSpPr>
+                <p:cNvPr id="13" name="TextBox 12">
+                  <a:extLst>
+                    <a:ext uri="{FF2B5EF4-FFF2-40B4-BE49-F238E27FC236}">
+                      <a16:creationId xmlns:a16="http://schemas.microsoft.com/office/drawing/2014/main" id="{ACDD241B-69BE-124B-8B03-7E89E1E2BDBC}"/>
+                    </a:ext>
+                  </a:extLst>
+                </p:cNvPr>
+                <p:cNvSpPr txBox="1"/>
+                <p:nvPr/>
+              </p:nvSpPr>
+              <p:spPr>
+                <a:xfrm>
+                  <a:off x="2615917" y="5742344"/>
+                  <a:ext cx="1337930" cy="219227"/>
+                </a:xfrm>
+                <a:prstGeom prst="rect">
+                  <a:avLst/>
+                </a:prstGeom>
+                <a:noFill/>
+              </p:spPr>
+              <p:txBody>
+                <a:bodyPr wrap="none" lIns="0" tIns="0" rIns="0" bIns="0" rtlCol="0">
+                  <a:spAutoFit/>
+                </a:bodyPr>
+                <a:lstStyle/>
+                <a:p>
+                  <a14:m>
                     <m:oMath xmlns:m="http://schemas.openxmlformats.org/officeDocument/2006/math">
                       <m:r>
                         <a:rPr lang="en-US" sz="1400" b="0" i="1" smtClean="0">
@@ -19763,7 +19963,7 @@
                                 <a:rPr lang="en-US" sz="1400" b="0" i="1" smtClean="0">
                                   <a:latin typeface="Cambria Math" panose="02040503050406030204" pitchFamily="18" charset="0"/>
                                 </a:rPr>
-                                <m:t>𝑖𝑠𝑜</m:t>
+                                <m:t>h𝑒𝑥</m:t>
                               </m:r>
                             </m:sub>
                           </m:sSub>
@@ -19773,128 +19973,100 @@
                         <a:rPr lang="en-US" sz="1400" b="0" i="1" smtClean="0">
                           <a:latin typeface="Cambria Math" panose="02040503050406030204" pitchFamily="18" charset="0"/>
                         </a:rPr>
-                        <m:t>𝑖𝑠𝑜𝑏𝑢𝑡𝑎𝑛𝑜𝑙</m:t>
-                      </m:r>
-                      <m:r>
-                        <a:rPr lang="en-US" sz="1400" b="0" i="1" smtClean="0">
-                          <a:latin typeface="Cambria Math" panose="02040503050406030204" pitchFamily="18" charset="0"/>
-                        </a:rPr>
                         <m:t> </m:t>
                       </m:r>
                     </m:oMath>
-                  </m:oMathPara>
-                </a14:m>
-                <a:endParaRPr lang="en-US" sz="1400" dirty="0"/>
-              </a:p>
-            </p:txBody>
-          </p:sp>
-        </mc:Choice>
-        <mc:Fallback xmlns="">
-          <p:sp>
-            <p:nvSpPr>
-              <p:cNvPr id="12" name="TextBox 11">
-                <a:extLst>
-                  <a:ext uri="{FF2B5EF4-FFF2-40B4-BE49-F238E27FC236}">
-                    <a16:creationId xmlns:a16="http://schemas.microsoft.com/office/drawing/2014/main" id="{8F7DFFA2-8069-9249-9CFF-24A014ED29EE}"/>
-                  </a:ext>
-                </a:extLst>
-              </p:cNvPr>
-              <p:cNvSpPr txBox="1">
-                <a:spLocks noRot="1" noChangeAspect="1" noMove="1" noResize="1" noEditPoints="1" noAdjustHandles="1" noChangeArrowheads="1" noChangeShapeType="1" noTextEdit="1"/>
-              </p:cNvSpPr>
-              <p:nvPr/>
-            </p:nvSpPr>
-            <p:spPr>
-              <a:xfrm>
-                <a:off x="7627321" y="5628283"/>
-                <a:ext cx="2113271" cy="219227"/>
-              </a:xfrm>
-              <a:prstGeom prst="rect">
-                <a:avLst/>
-              </a:prstGeom>
-              <a:blipFill>
-                <a:blip r:embed="rId7"/>
-                <a:stretch>
-                  <a:fillRect l="-2395" r="-2395" b="-38889"/>
-                </a:stretch>
-              </a:blipFill>
-            </p:spPr>
-            <p:txBody>
-              <a:bodyPr/>
-              <a:lstStyle/>
-              <a:p>
-                <a:r>
-                  <a:rPr lang="en-US">
-                    <a:noFill/>
-                  </a:rPr>
-                  <a:t> </a:t>
-                </a:r>
-              </a:p>
-            </p:txBody>
-          </p:sp>
-        </mc:Fallback>
-      </mc:AlternateContent>
-      <mc:AlternateContent xmlns:mc="http://schemas.openxmlformats.org/markup-compatibility/2006" xmlns:a14="http://schemas.microsoft.com/office/drawing/2010/main">
-        <mc:Choice Requires="a14">
-          <p:sp>
-            <p:nvSpPr>
-              <p:cNvPr id="13" name="TextBox 12">
-                <a:extLst>
-                  <a:ext uri="{FF2B5EF4-FFF2-40B4-BE49-F238E27FC236}">
-                    <a16:creationId xmlns:a16="http://schemas.microsoft.com/office/drawing/2014/main" id="{ACDD241B-69BE-124B-8B03-7E89E1E2BDBC}"/>
-                  </a:ext>
-                </a:extLst>
-              </p:cNvPr>
-              <p:cNvSpPr txBox="1"/>
-              <p:nvPr/>
-            </p:nvSpPr>
-            <p:spPr>
-              <a:xfrm>
-                <a:off x="2615917" y="5742344"/>
-                <a:ext cx="1337930" cy="219227"/>
-              </a:xfrm>
-              <a:prstGeom prst="rect">
-                <a:avLst/>
-              </a:prstGeom>
-              <a:noFill/>
-            </p:spPr>
-            <p:txBody>
-              <a:bodyPr wrap="none" lIns="0" tIns="0" rIns="0" bIns="0" rtlCol="0">
-                <a:spAutoFit/>
-              </a:bodyPr>
-              <a:lstStyle/>
-              <a:p>
-                <a14:m>
-                  <m:oMath xmlns:m="http://schemas.openxmlformats.org/officeDocument/2006/math">
-                    <m:r>
-                      <a:rPr lang="en-US" sz="1400" b="0" i="1" smtClean="0">
-                        <a:latin typeface="Cambria Math" panose="02040503050406030204" pitchFamily="18" charset="0"/>
-                      </a:rPr>
-                      <m:t>𝑔𝑙𝑢𝑐𝑜𝑠𝑒</m:t>
-                    </m:r>
-                    <m:r>
-                      <a:rPr lang="en-US" sz="1400" b="0" i="1" smtClean="0">
-                        <a:latin typeface="Cambria Math" panose="02040503050406030204" pitchFamily="18" charset="0"/>
-                      </a:rPr>
-                      <m:t> </m:t>
-                    </m:r>
-                    <m:sSup>
-                      <m:sSupPr>
-                        <m:ctrlPr>
-                          <a:rPr lang="en-US" sz="1400" b="0" i="1" smtClean="0">
-                            <a:latin typeface="Cambria Math" panose="02040503050406030204" pitchFamily="18" charset="0"/>
-                          </a:rPr>
-                        </m:ctrlPr>
-                      </m:sSupPr>
-                      <m:e>
-                        <m:r>
-                          <a:rPr lang="en-US" sz="1400" b="0" i="1" smtClean="0">
-                            <a:latin typeface="Cambria Math" panose="02040503050406030204" pitchFamily="18" charset="0"/>
-                          </a:rPr>
-                          <m:t>→</m:t>
-                        </m:r>
-                      </m:e>
-                      <m:sup>
+                  </a14:m>
+                  <a:r>
+                    <a:rPr lang="en-US" sz="1400" dirty="0"/>
+                    <a:t> ⌀</a:t>
+                  </a:r>
+                </a:p>
+              </p:txBody>
+            </p:sp>
+          </mc:Choice>
+          <mc:Fallback>
+            <p:sp>
+              <p:nvSpPr>
+                <p:cNvPr id="13" name="TextBox 12">
+                  <a:extLst>
+                    <a:ext uri="{FF2B5EF4-FFF2-40B4-BE49-F238E27FC236}">
+                      <a16:creationId xmlns:a16="http://schemas.microsoft.com/office/drawing/2014/main" id="{ACDD241B-69BE-124B-8B03-7E89E1E2BDBC}"/>
+                    </a:ext>
+                  </a:extLst>
+                </p:cNvPr>
+                <p:cNvSpPr txBox="1">
+                  <a:spLocks noRot="1" noChangeAspect="1" noMove="1" noResize="1" noEditPoints="1" noAdjustHandles="1" noChangeArrowheads="1" noChangeShapeType="1" noTextEdit="1"/>
+                </p:cNvSpPr>
+                <p:nvPr/>
+              </p:nvSpPr>
+              <p:spPr>
+                <a:xfrm>
+                  <a:off x="2615917" y="5742344"/>
+                  <a:ext cx="1337930" cy="219227"/>
+                </a:xfrm>
+                <a:prstGeom prst="rect">
+                  <a:avLst/>
+                </a:prstGeom>
+                <a:blipFill>
+                  <a:blip r:embed="rId8"/>
+                  <a:stretch>
+                    <a:fillRect l="-5660" t="-22222" r="-7547" b="-50000"/>
+                  </a:stretch>
+                </a:blipFill>
+              </p:spPr>
+              <p:txBody>
+                <a:bodyPr/>
+                <a:lstStyle/>
+                <a:p>
+                  <a:r>
+                    <a:rPr lang="en-US">
+                      <a:noFill/>
+                    </a:rPr>
+                    <a:t> </a:t>
+                  </a:r>
+                </a:p>
+              </p:txBody>
+            </p:sp>
+          </mc:Fallback>
+        </mc:AlternateContent>
+        <mc:AlternateContent xmlns:mc="http://schemas.openxmlformats.org/markup-compatibility/2006">
+          <mc:Choice xmlns:a14="http://schemas.microsoft.com/office/drawing/2010/main" Requires="a14">
+            <p:sp>
+              <p:nvSpPr>
+                <p:cNvPr id="14" name="TextBox 13">
+                  <a:extLst>
+                    <a:ext uri="{FF2B5EF4-FFF2-40B4-BE49-F238E27FC236}">
+                      <a16:creationId xmlns:a16="http://schemas.microsoft.com/office/drawing/2014/main" id="{2F304252-6206-A24F-898A-665DEF078479}"/>
+                    </a:ext>
+                  </a:extLst>
+                </p:cNvPr>
+                <p:cNvSpPr txBox="1"/>
+                <p:nvPr/>
+              </p:nvSpPr>
+              <p:spPr>
+                <a:xfrm>
+                  <a:off x="2810329" y="6175911"/>
+                  <a:ext cx="949106" cy="215444"/>
+                </a:xfrm>
+                <a:prstGeom prst="rect">
+                  <a:avLst/>
+                </a:prstGeom>
+                <a:noFill/>
+              </p:spPr>
+              <p:txBody>
+                <a:bodyPr wrap="none" lIns="0" tIns="0" rIns="0" bIns="0" rtlCol="0">
+                  <a:spAutoFit/>
+                </a:bodyPr>
+                <a:lstStyle/>
+                <a:p>
+                  <a:pPr/>
+                  <a14:m>
+                    <m:oMathPara xmlns:m="http://schemas.openxmlformats.org/officeDocument/2006/math">
+                      <m:oMathParaPr>
+                        <m:jc m:val="centerGroup"/>
+                      </m:oMathParaPr>
+                      <m:oMath xmlns:m="http://schemas.openxmlformats.org/officeDocument/2006/math">
                         <m:sSub>
                           <m:sSubPr>
                             <m:ctrlPr>
@@ -19920,311 +20092,187 @@
                             </m:r>
                           </m:sub>
                         </m:sSub>
-                      </m:sup>
-                    </m:sSup>
-                    <m:r>
-                      <a:rPr lang="en-US" sz="1400" b="0" i="1" smtClean="0">
-                        <a:latin typeface="Cambria Math" panose="02040503050406030204" pitchFamily="18" charset="0"/>
-                      </a:rPr>
-                      <m:t> </m:t>
-                    </m:r>
-                  </m:oMath>
-                </a14:m>
-                <a:r>
-                  <a:rPr lang="en-US" sz="1400" dirty="0"/>
-                  <a:t> ⌀</a:t>
-                </a:r>
-              </a:p>
-            </p:txBody>
-          </p:sp>
-        </mc:Choice>
-        <mc:Fallback xmlns="">
-          <p:sp>
-            <p:nvSpPr>
-              <p:cNvPr id="13" name="TextBox 12">
-                <a:extLst>
-                  <a:ext uri="{FF2B5EF4-FFF2-40B4-BE49-F238E27FC236}">
-                    <a16:creationId xmlns:a16="http://schemas.microsoft.com/office/drawing/2014/main" id="{ACDD241B-69BE-124B-8B03-7E89E1E2BDBC}"/>
-                  </a:ext>
-                </a:extLst>
-              </p:cNvPr>
-              <p:cNvSpPr txBox="1">
-                <a:spLocks noRot="1" noChangeAspect="1" noMove="1" noResize="1" noEditPoints="1" noAdjustHandles="1" noChangeArrowheads="1" noChangeShapeType="1" noTextEdit="1"/>
-              </p:cNvSpPr>
-              <p:nvPr/>
-            </p:nvSpPr>
-            <p:spPr>
-              <a:xfrm>
-                <a:off x="2615917" y="5742344"/>
-                <a:ext cx="1337930" cy="219227"/>
-              </a:xfrm>
-              <a:prstGeom prst="rect">
-                <a:avLst/>
-              </a:prstGeom>
-              <a:blipFill>
-                <a:blip r:embed="rId8"/>
-                <a:stretch>
-                  <a:fillRect l="-5660" t="-22222" r="-7547" b="-50000"/>
-                </a:stretch>
-              </a:blipFill>
-            </p:spPr>
-            <p:txBody>
-              <a:bodyPr/>
-              <a:lstStyle/>
-              <a:p>
-                <a:r>
-                  <a:rPr lang="en-US">
-                    <a:noFill/>
-                  </a:rPr>
-                  <a:t> </a:t>
-                </a:r>
-              </a:p>
-            </p:txBody>
-          </p:sp>
-        </mc:Fallback>
-      </mc:AlternateContent>
-      <mc:AlternateContent xmlns:mc="http://schemas.openxmlformats.org/markup-compatibility/2006" xmlns:a14="http://schemas.microsoft.com/office/drawing/2010/main">
-        <mc:Choice Requires="a14">
-          <p:sp>
-            <p:nvSpPr>
-              <p:cNvPr id="14" name="TextBox 13">
-                <a:extLst>
-                  <a:ext uri="{FF2B5EF4-FFF2-40B4-BE49-F238E27FC236}">
-                    <a16:creationId xmlns:a16="http://schemas.microsoft.com/office/drawing/2014/main" id="{2F304252-6206-A24F-898A-665DEF078479}"/>
-                  </a:ext>
-                </a:extLst>
-              </p:cNvPr>
-              <p:cNvSpPr txBox="1"/>
-              <p:nvPr/>
-            </p:nvSpPr>
-            <p:spPr>
-              <a:xfrm>
-                <a:off x="2810329" y="6175911"/>
-                <a:ext cx="949106" cy="215444"/>
-              </a:xfrm>
-              <a:prstGeom prst="rect">
-                <a:avLst/>
-              </a:prstGeom>
-              <a:noFill/>
-            </p:spPr>
-            <p:txBody>
-              <a:bodyPr wrap="none" lIns="0" tIns="0" rIns="0" bIns="0" rtlCol="0">
-                <a:spAutoFit/>
-              </a:bodyPr>
-              <a:lstStyle/>
-              <a:p>
-                <a:pPr/>
-                <a14:m>
-                  <m:oMathPara xmlns:m="http://schemas.openxmlformats.org/officeDocument/2006/math">
-                    <m:oMathParaPr>
-                      <m:jc m:val="centerGroup"/>
-                    </m:oMathParaPr>
-                    <m:oMath xmlns:m="http://schemas.openxmlformats.org/officeDocument/2006/math">
-                      <m:sSub>
-                        <m:sSubPr>
-                          <m:ctrlPr>
-                            <a:rPr lang="en-US" sz="1400" b="0" i="1" smtClean="0">
-                              <a:latin typeface="Cambria Math" panose="02040503050406030204" pitchFamily="18" charset="0"/>
-                            </a:rPr>
-                          </m:ctrlPr>
-                        </m:sSubPr>
-                        <m:e>
-                          <m:r>
-                            <a:rPr lang="en-US" sz="1400" b="0" i="1" smtClean="0">
-                              <a:latin typeface="Cambria Math" panose="02040503050406030204" pitchFamily="18" charset="0"/>
-                            </a:rPr>
-                            <m:t>𝑘</m:t>
-                          </m:r>
-                        </m:e>
-                        <m:sub>
-                          <m:r>
-                            <a:rPr lang="en-US" sz="1400" b="0" i="1" smtClean="0">
-                              <a:latin typeface="Cambria Math" panose="02040503050406030204" pitchFamily="18" charset="0"/>
-                            </a:rPr>
-                            <m:t>h𝑒𝑥</m:t>
-                          </m:r>
-                        </m:sub>
-                      </m:sSub>
-                      <m:r>
-                        <a:rPr lang="en-US" sz="1400" b="0" i="1" smtClean="0">
-                          <a:latin typeface="Cambria Math" panose="02040503050406030204" pitchFamily="18" charset="0"/>
-                        </a:rPr>
-                        <m:t>=0.06</m:t>
-                      </m:r>
-                    </m:oMath>
-                  </m:oMathPara>
-                </a14:m>
-                <a:endParaRPr lang="en-US" sz="1400" dirty="0"/>
-              </a:p>
-            </p:txBody>
-          </p:sp>
-        </mc:Choice>
-        <mc:Fallback xmlns="">
-          <p:sp>
-            <p:nvSpPr>
-              <p:cNvPr id="14" name="TextBox 13">
-                <a:extLst>
-                  <a:ext uri="{FF2B5EF4-FFF2-40B4-BE49-F238E27FC236}">
-                    <a16:creationId xmlns:a16="http://schemas.microsoft.com/office/drawing/2014/main" id="{2F304252-6206-A24F-898A-665DEF078479}"/>
-                  </a:ext>
-                </a:extLst>
-              </p:cNvPr>
-              <p:cNvSpPr txBox="1">
-                <a:spLocks noRot="1" noChangeAspect="1" noMove="1" noResize="1" noEditPoints="1" noAdjustHandles="1" noChangeArrowheads="1" noChangeShapeType="1" noTextEdit="1"/>
-              </p:cNvSpPr>
-              <p:nvPr/>
-            </p:nvSpPr>
-            <p:spPr>
-              <a:xfrm>
-                <a:off x="2810329" y="6175911"/>
-                <a:ext cx="949106" cy="215444"/>
-              </a:xfrm>
-              <a:prstGeom prst="rect">
-                <a:avLst/>
-              </a:prstGeom>
-              <a:blipFill>
-                <a:blip r:embed="rId9"/>
-                <a:stretch>
-                  <a:fillRect l="-3947" r="-2632" b="-11111"/>
-                </a:stretch>
-              </a:blipFill>
-            </p:spPr>
-            <p:txBody>
-              <a:bodyPr/>
-              <a:lstStyle/>
-              <a:p>
-                <a:r>
-                  <a:rPr lang="en-US">
-                    <a:noFill/>
-                  </a:rPr>
-                  <a:t> </a:t>
-                </a:r>
-              </a:p>
-            </p:txBody>
-          </p:sp>
-        </mc:Fallback>
-      </mc:AlternateContent>
-      <mc:AlternateContent xmlns:mc="http://schemas.openxmlformats.org/markup-compatibility/2006" xmlns:a14="http://schemas.microsoft.com/office/drawing/2010/main">
-        <mc:Choice Requires="a14">
-          <p:sp>
-            <p:nvSpPr>
-              <p:cNvPr id="15" name="TextBox 14">
-                <a:extLst>
-                  <a:ext uri="{FF2B5EF4-FFF2-40B4-BE49-F238E27FC236}">
-                    <a16:creationId xmlns:a16="http://schemas.microsoft.com/office/drawing/2014/main" id="{BCC2CA93-B1CF-CE43-856B-DD8C452F34F9}"/>
-                  </a:ext>
-                </a:extLst>
-              </p:cNvPr>
-              <p:cNvSpPr txBox="1"/>
-              <p:nvPr/>
-            </p:nvSpPr>
-            <p:spPr>
-              <a:xfrm>
-                <a:off x="8180869" y="6175911"/>
-                <a:ext cx="1006173" cy="215444"/>
-              </a:xfrm>
-              <a:prstGeom prst="rect">
-                <a:avLst/>
-              </a:prstGeom>
-              <a:noFill/>
-            </p:spPr>
-            <p:txBody>
-              <a:bodyPr wrap="none" lIns="0" tIns="0" rIns="0" bIns="0" rtlCol="0">
-                <a:spAutoFit/>
-              </a:bodyPr>
-              <a:lstStyle/>
-              <a:p>
-                <a:pPr/>
-                <a14:m>
-                  <m:oMathPara xmlns:m="http://schemas.openxmlformats.org/officeDocument/2006/math">
-                    <m:oMathParaPr>
-                      <m:jc m:val="centerGroup"/>
-                    </m:oMathParaPr>
-                    <m:oMath xmlns:m="http://schemas.openxmlformats.org/officeDocument/2006/math">
-                      <m:sSub>
-                        <m:sSubPr>
-                          <m:ctrlPr>
-                            <a:rPr lang="en-US" sz="1400" b="0" i="1" smtClean="0">
-                              <a:latin typeface="Cambria Math" panose="02040503050406030204" pitchFamily="18" charset="0"/>
-                            </a:rPr>
-                          </m:ctrlPr>
-                        </m:sSubPr>
-                        <m:e>
-                          <m:r>
-                            <a:rPr lang="en-US" sz="1400" b="0" i="1" smtClean="0">
-                              <a:latin typeface="Cambria Math" panose="02040503050406030204" pitchFamily="18" charset="0"/>
-                            </a:rPr>
-                            <m:t>𝑘</m:t>
-                          </m:r>
-                        </m:e>
-                        <m:sub>
-                          <m:r>
-                            <a:rPr lang="en-US" sz="1400" b="0" i="1" smtClean="0">
-                              <a:latin typeface="Cambria Math" panose="02040503050406030204" pitchFamily="18" charset="0"/>
-                            </a:rPr>
-                            <m:t>𝑖𝑠𝑜</m:t>
-                          </m:r>
-                        </m:sub>
-                      </m:sSub>
-                      <m:r>
-                        <a:rPr lang="en-US" sz="1400" b="0" i="1" smtClean="0">
-                          <a:latin typeface="Cambria Math" panose="02040503050406030204" pitchFamily="18" charset="0"/>
-                        </a:rPr>
-                        <m:t>=0.057</m:t>
-                      </m:r>
-                    </m:oMath>
-                  </m:oMathPara>
-                </a14:m>
-                <a:endParaRPr lang="en-US" sz="1400" dirty="0"/>
-              </a:p>
-            </p:txBody>
-          </p:sp>
-        </mc:Choice>
-        <mc:Fallback xmlns="">
-          <p:sp>
-            <p:nvSpPr>
-              <p:cNvPr id="15" name="TextBox 14">
-                <a:extLst>
-                  <a:ext uri="{FF2B5EF4-FFF2-40B4-BE49-F238E27FC236}">
-                    <a16:creationId xmlns:a16="http://schemas.microsoft.com/office/drawing/2014/main" id="{BCC2CA93-B1CF-CE43-856B-DD8C452F34F9}"/>
-                  </a:ext>
-                </a:extLst>
-              </p:cNvPr>
-              <p:cNvSpPr txBox="1">
-                <a:spLocks noRot="1" noChangeAspect="1" noMove="1" noResize="1" noEditPoints="1" noAdjustHandles="1" noChangeArrowheads="1" noChangeShapeType="1" noTextEdit="1"/>
-              </p:cNvSpPr>
-              <p:nvPr/>
-            </p:nvSpPr>
-            <p:spPr>
-              <a:xfrm>
-                <a:off x="8180869" y="6175911"/>
-                <a:ext cx="1006173" cy="215444"/>
-              </a:xfrm>
-              <a:prstGeom prst="rect">
-                <a:avLst/>
-              </a:prstGeom>
-              <a:blipFill>
-                <a:blip r:embed="rId10"/>
-                <a:stretch>
-                  <a:fillRect l="-3750" r="-3750" b="-11111"/>
-                </a:stretch>
-              </a:blipFill>
-            </p:spPr>
-            <p:txBody>
-              <a:bodyPr/>
-              <a:lstStyle/>
-              <a:p>
-                <a:r>
-                  <a:rPr lang="en-US">
-                    <a:noFill/>
-                  </a:rPr>
-                  <a:t> </a:t>
-                </a:r>
-              </a:p>
-            </p:txBody>
-          </p:sp>
-        </mc:Fallback>
-      </mc:AlternateContent>
+                        <m:r>
+                          <a:rPr lang="en-US" sz="1400" b="0" i="1" smtClean="0">
+                            <a:latin typeface="Cambria Math" panose="02040503050406030204" pitchFamily="18" charset="0"/>
+                          </a:rPr>
+                          <m:t>=0.06</m:t>
+                        </m:r>
+                      </m:oMath>
+                    </m:oMathPara>
+                  </a14:m>
+                  <a:endParaRPr lang="en-US" sz="1400" dirty="0"/>
+                </a:p>
+              </p:txBody>
+            </p:sp>
+          </mc:Choice>
+          <mc:Fallback>
+            <p:sp>
+              <p:nvSpPr>
+                <p:cNvPr id="14" name="TextBox 13">
+                  <a:extLst>
+                    <a:ext uri="{FF2B5EF4-FFF2-40B4-BE49-F238E27FC236}">
+                      <a16:creationId xmlns:a16="http://schemas.microsoft.com/office/drawing/2014/main" id="{2F304252-6206-A24F-898A-665DEF078479}"/>
+                    </a:ext>
+                  </a:extLst>
+                </p:cNvPr>
+                <p:cNvSpPr txBox="1">
+                  <a:spLocks noRot="1" noChangeAspect="1" noMove="1" noResize="1" noEditPoints="1" noAdjustHandles="1" noChangeArrowheads="1" noChangeShapeType="1" noTextEdit="1"/>
+                </p:cNvSpPr>
+                <p:nvPr/>
+              </p:nvSpPr>
+              <p:spPr>
+                <a:xfrm>
+                  <a:off x="2810329" y="6175911"/>
+                  <a:ext cx="949106" cy="215444"/>
+                </a:xfrm>
+                <a:prstGeom prst="rect">
+                  <a:avLst/>
+                </a:prstGeom>
+                <a:blipFill>
+                  <a:blip r:embed="rId9"/>
+                  <a:stretch>
+                    <a:fillRect l="-3947" r="-2632" b="-11111"/>
+                  </a:stretch>
+                </a:blipFill>
+              </p:spPr>
+              <p:txBody>
+                <a:bodyPr/>
+                <a:lstStyle/>
+                <a:p>
+                  <a:r>
+                    <a:rPr lang="en-US">
+                      <a:noFill/>
+                    </a:rPr>
+                    <a:t> </a:t>
+                  </a:r>
+                </a:p>
+              </p:txBody>
+            </p:sp>
+          </mc:Fallback>
+        </mc:AlternateContent>
+        <mc:AlternateContent xmlns:mc="http://schemas.openxmlformats.org/markup-compatibility/2006">
+          <mc:Choice xmlns:a14="http://schemas.microsoft.com/office/drawing/2010/main" Requires="a14">
+            <p:sp>
+              <p:nvSpPr>
+                <p:cNvPr id="15" name="TextBox 14">
+                  <a:extLst>
+                    <a:ext uri="{FF2B5EF4-FFF2-40B4-BE49-F238E27FC236}">
+                      <a16:creationId xmlns:a16="http://schemas.microsoft.com/office/drawing/2014/main" id="{BCC2CA93-B1CF-CE43-856B-DD8C452F34F9}"/>
+                    </a:ext>
+                  </a:extLst>
+                </p:cNvPr>
+                <p:cNvSpPr txBox="1"/>
+                <p:nvPr/>
+              </p:nvSpPr>
+              <p:spPr>
+                <a:xfrm>
+                  <a:off x="8180869" y="6175911"/>
+                  <a:ext cx="1006173" cy="215444"/>
+                </a:xfrm>
+                <a:prstGeom prst="rect">
+                  <a:avLst/>
+                </a:prstGeom>
+                <a:noFill/>
+              </p:spPr>
+              <p:txBody>
+                <a:bodyPr wrap="none" lIns="0" tIns="0" rIns="0" bIns="0" rtlCol="0">
+                  <a:spAutoFit/>
+                </a:bodyPr>
+                <a:lstStyle/>
+                <a:p>
+                  <a:pPr/>
+                  <a14:m>
+                    <m:oMathPara xmlns:m="http://schemas.openxmlformats.org/officeDocument/2006/math">
+                      <m:oMathParaPr>
+                        <m:jc m:val="centerGroup"/>
+                      </m:oMathParaPr>
+                      <m:oMath xmlns:m="http://schemas.openxmlformats.org/officeDocument/2006/math">
+                        <m:sSub>
+                          <m:sSubPr>
+                            <m:ctrlPr>
+                              <a:rPr lang="en-US" sz="1400" b="0" i="1" smtClean="0">
+                                <a:latin typeface="Cambria Math" panose="02040503050406030204" pitchFamily="18" charset="0"/>
+                              </a:rPr>
+                            </m:ctrlPr>
+                          </m:sSubPr>
+                          <m:e>
+                            <m:r>
+                              <a:rPr lang="en-US" sz="1400" b="0" i="1" smtClean="0">
+                                <a:latin typeface="Cambria Math" panose="02040503050406030204" pitchFamily="18" charset="0"/>
+                              </a:rPr>
+                              <m:t>𝑘</m:t>
+                            </m:r>
+                          </m:e>
+                          <m:sub>
+                            <m:r>
+                              <a:rPr lang="en-US" sz="1400" b="0" i="1" smtClean="0">
+                                <a:latin typeface="Cambria Math" panose="02040503050406030204" pitchFamily="18" charset="0"/>
+                              </a:rPr>
+                              <m:t>𝑖𝑠𝑜</m:t>
+                            </m:r>
+                          </m:sub>
+                        </m:sSub>
+                        <m:r>
+                          <a:rPr lang="en-US" sz="1400" b="0" i="1" smtClean="0">
+                            <a:latin typeface="Cambria Math" panose="02040503050406030204" pitchFamily="18" charset="0"/>
+                          </a:rPr>
+                          <m:t>=0.057</m:t>
+                        </m:r>
+                      </m:oMath>
+                    </m:oMathPara>
+                  </a14:m>
+                  <a:endParaRPr lang="en-US" sz="1400" dirty="0"/>
+                </a:p>
+              </p:txBody>
+            </p:sp>
+          </mc:Choice>
+          <mc:Fallback>
+            <p:sp>
+              <p:nvSpPr>
+                <p:cNvPr id="15" name="TextBox 14">
+                  <a:extLst>
+                    <a:ext uri="{FF2B5EF4-FFF2-40B4-BE49-F238E27FC236}">
+                      <a16:creationId xmlns:a16="http://schemas.microsoft.com/office/drawing/2014/main" id="{BCC2CA93-B1CF-CE43-856B-DD8C452F34F9}"/>
+                    </a:ext>
+                  </a:extLst>
+                </p:cNvPr>
+                <p:cNvSpPr txBox="1">
+                  <a:spLocks noRot="1" noChangeAspect="1" noMove="1" noResize="1" noEditPoints="1" noAdjustHandles="1" noChangeArrowheads="1" noChangeShapeType="1" noTextEdit="1"/>
+                </p:cNvSpPr>
+                <p:nvPr/>
+              </p:nvSpPr>
+              <p:spPr>
+                <a:xfrm>
+                  <a:off x="8180869" y="6175911"/>
+                  <a:ext cx="1006173" cy="215444"/>
+                </a:xfrm>
+                <a:prstGeom prst="rect">
+                  <a:avLst/>
+                </a:prstGeom>
+                <a:blipFill>
+                  <a:blip r:embed="rId10"/>
+                  <a:stretch>
+                    <a:fillRect l="-3750" r="-3750" b="-11111"/>
+                  </a:stretch>
+                </a:blipFill>
+              </p:spPr>
+              <p:txBody>
+                <a:bodyPr/>
+                <a:lstStyle/>
+                <a:p>
+                  <a:r>
+                    <a:rPr lang="en-US">
+                      <a:noFill/>
+                    </a:rPr>
+                    <a:t> </a:t>
+                  </a:r>
+                </a:p>
+              </p:txBody>
+            </p:sp>
+          </mc:Fallback>
+        </mc:AlternateContent>
+      </p:grpSp>
       <p:pic>
         <p:nvPicPr>
           <p:cNvPr id="16" name="Picture 15" descr="A picture containing drawing&#10;&#10;Description automatically generated">

</xml_diff>